<commit_message>
Update presentation and word doc
</commit_message>
<xml_diff>
--- a/Documents/Presentation.pptx
+++ b/Documents/Presentation.pptx
@@ -11,10 +11,11 @@
     <p:sldId id="259" r:id="rId5"/>
     <p:sldId id="265" r:id="rId6"/>
     <p:sldId id="260" r:id="rId7"/>
-    <p:sldId id="262" r:id="rId8"/>
-    <p:sldId id="261" r:id="rId9"/>
-    <p:sldId id="264" r:id="rId10"/>
-    <p:sldId id="266" r:id="rId11"/>
+    <p:sldId id="267" r:id="rId8"/>
+    <p:sldId id="262" r:id="rId9"/>
+    <p:sldId id="261" r:id="rId10"/>
+    <p:sldId id="264" r:id="rId11"/>
+    <p:sldId id="266" r:id="rId12"/>
   </p:sldIdLst>
   <p:sldSz cx="9144000" cy="6858000" type="screen4x3"/>
   <p:notesSz cx="6858000" cy="9144000"/>
@@ -309,7 +310,7 @@
             <a:fld id="{1D8BD707-D9CF-40AE-B4C6-C98DA3205C09}" type="datetimeFigureOut">
               <a:rPr lang="en-US" smtClean="0"/>
               <a:pPr/>
-              <a:t>5/13/13</a:t>
+              <a:t>5/16/2013</a:t>
             </a:fld>
             <a:endParaRPr lang="en-US"/>
           </a:p>
@@ -476,7 +477,7 @@
             <a:fld id="{1D8BD707-D9CF-40AE-B4C6-C98DA3205C09}" type="datetimeFigureOut">
               <a:rPr lang="en-US" smtClean="0"/>
               <a:pPr/>
-              <a:t>5/13/13</a:t>
+              <a:t>5/16/2013</a:t>
             </a:fld>
             <a:endParaRPr lang="en-US"/>
           </a:p>
@@ -653,7 +654,7 @@
             <a:fld id="{1D8BD707-D9CF-40AE-B4C6-C98DA3205C09}" type="datetimeFigureOut">
               <a:rPr lang="en-US" smtClean="0"/>
               <a:pPr/>
-              <a:t>5/13/13</a:t>
+              <a:t>5/16/2013</a:t>
             </a:fld>
             <a:endParaRPr lang="en-US"/>
           </a:p>
@@ -838,7 +839,7 @@
             <a:fld id="{1D8BD707-D9CF-40AE-B4C6-C98DA3205C09}" type="datetimeFigureOut">
               <a:rPr lang="en-US" smtClean="0"/>
               <a:pPr/>
-              <a:t>5/13/13</a:t>
+              <a:t>5/16/2013</a:t>
             </a:fld>
             <a:endParaRPr lang="en-US"/>
           </a:p>
@@ -1102,7 +1103,7 @@
             <a:fld id="{1D8BD707-D9CF-40AE-B4C6-C98DA3205C09}" type="datetimeFigureOut">
               <a:rPr lang="en-US" smtClean="0"/>
               <a:pPr/>
-              <a:t>5/13/13</a:t>
+              <a:t>5/16/2013</a:t>
             </a:fld>
             <a:endParaRPr lang="en-US"/>
           </a:p>
@@ -1452,7 +1453,7 @@
             <a:fld id="{1D8BD707-D9CF-40AE-B4C6-C98DA3205C09}" type="datetimeFigureOut">
               <a:rPr lang="en-US" smtClean="0"/>
               <a:pPr/>
-              <a:t>5/13/13</a:t>
+              <a:t>5/16/2013</a:t>
             </a:fld>
             <a:endParaRPr lang="en-US"/>
           </a:p>
@@ -1762,7 +1763,7 @@
             <a:fld id="{1D8BD707-D9CF-40AE-B4C6-C98DA3205C09}" type="datetimeFigureOut">
               <a:rPr lang="en-US" smtClean="0"/>
               <a:pPr/>
-              <a:t>5/13/13</a:t>
+              <a:t>5/16/2013</a:t>
             </a:fld>
             <a:endParaRPr lang="en-US"/>
           </a:p>
@@ -1991,7 +1992,7 @@
             <a:fld id="{1D8BD707-D9CF-40AE-B4C6-C98DA3205C09}" type="datetimeFigureOut">
               <a:rPr lang="en-US" smtClean="0"/>
               <a:pPr/>
-              <a:t>5/13/13</a:t>
+              <a:t>5/16/2013</a:t>
             </a:fld>
             <a:endParaRPr lang="en-US"/>
           </a:p>
@@ -2083,7 +2084,7 @@
             <a:fld id="{1D8BD707-D9CF-40AE-B4C6-C98DA3205C09}" type="datetimeFigureOut">
               <a:rPr lang="en-US" smtClean="0"/>
               <a:pPr/>
-              <a:t>5/13/13</a:t>
+              <a:t>5/16/2013</a:t>
             </a:fld>
             <a:endParaRPr lang="en-US"/>
           </a:p>
@@ -2373,7 +2374,7 @@
             <a:fld id="{1D8BD707-D9CF-40AE-B4C6-C98DA3205C09}" type="datetimeFigureOut">
               <a:rPr lang="en-US" smtClean="0"/>
               <a:pPr/>
-              <a:t>5/13/13</a:t>
+              <a:t>5/16/2013</a:t>
             </a:fld>
             <a:endParaRPr lang="en-US"/>
           </a:p>
@@ -2644,7 +2645,7 @@
             <a:fld id="{1D8BD707-D9CF-40AE-B4C6-C98DA3205C09}" type="datetimeFigureOut">
               <a:rPr lang="en-US" smtClean="0"/>
               <a:pPr/>
-              <a:t>5/13/13</a:t>
+              <a:t>5/16/2013</a:t>
             </a:fld>
             <a:endParaRPr lang="en-US"/>
           </a:p>
@@ -2856,7 +2857,7 @@
             <a:fld id="{1D8BD707-D9CF-40AE-B4C6-C98DA3205C09}" type="datetimeFigureOut">
               <a:rPr lang="en-US" smtClean="0"/>
               <a:pPr/>
-              <a:t>5/13/13</a:t>
+              <a:t>5/16/2013</a:t>
             </a:fld>
             <a:endParaRPr lang="en-US"/>
           </a:p>
@@ -3509,6 +3510,103 @@
           <a:lstStyle/>
           <a:p>
             <a:r>
+              <a:rPr lang="en-US" dirty="0" smtClean="0"/>
+              <a:t>Differently the Next Time</a:t>
+            </a:r>
+            <a:endParaRPr lang="en-US" dirty="0"/>
+          </a:p>
+        </p:txBody>
+      </p:sp>
+      <p:sp>
+        <p:nvSpPr>
+          <p:cNvPr id="3" name="Content Placeholder 2"/>
+          <p:cNvSpPr>
+            <a:spLocks noGrp="1"/>
+          </p:cNvSpPr>
+          <p:nvPr>
+            <p:ph idx="1"/>
+          </p:nvPr>
+        </p:nvSpPr>
+        <p:spPr/>
+        <p:txBody>
+          <a:bodyPr/>
+          <a:lstStyle/>
+          <a:p>
+            <a:endParaRPr lang="en-US" dirty="0" smtClean="0"/>
+          </a:p>
+          <a:p>
+            <a:r>
+              <a:rPr lang="en-US" dirty="0" smtClean="0"/>
+              <a:t>Choose application subject sooner</a:t>
+            </a:r>
+          </a:p>
+          <a:p>
+            <a:endParaRPr lang="en-US" dirty="0" smtClean="0"/>
+          </a:p>
+          <a:p>
+            <a:r>
+              <a:rPr lang="en-US" dirty="0" smtClean="0"/>
+              <a:t>Choose technology sooner</a:t>
+            </a:r>
+          </a:p>
+          <a:p>
+            <a:endParaRPr lang="en-US" dirty="0" smtClean="0"/>
+          </a:p>
+          <a:p>
+            <a:r>
+              <a:rPr lang="en-US" dirty="0" smtClean="0"/>
+              <a:t>Create web or mobile application</a:t>
+            </a:r>
+            <a:endParaRPr lang="en-US" dirty="0"/>
+          </a:p>
+        </p:txBody>
+      </p:sp>
+    </p:spTree>
+    <p:extLst>
+      <p:ext uri="{BB962C8B-B14F-4D97-AF65-F5344CB8AC3E}">
+        <p14:creationId xmlns:p14="http://schemas.microsoft.com/office/powerpoint/2010/main" val="1402356455"/>
+      </p:ext>
+    </p:extLst>
+  </p:cSld>
+  <p:clrMapOvr>
+    <a:masterClrMapping/>
+  </p:clrMapOvr>
+</p:sld>
+</file>
+
+<file path=ppt/slides/slide11.xml><?xml version="1.0" encoding="utf-8"?>
+<p:sld xmlns:a="http://schemas.openxmlformats.org/drawingml/2006/main" xmlns:r="http://schemas.openxmlformats.org/officeDocument/2006/relationships" xmlns:p="http://schemas.openxmlformats.org/presentationml/2006/main">
+  <p:cSld>
+    <p:spTree>
+      <p:nvGrpSpPr>
+        <p:cNvPr id="1" name=""/>
+        <p:cNvGrpSpPr/>
+        <p:nvPr/>
+      </p:nvGrpSpPr>
+      <p:grpSpPr>
+        <a:xfrm>
+          <a:off x="0" y="0"/>
+          <a:ext cx="0" cy="0"/>
+          <a:chOff x="0" y="0"/>
+          <a:chExt cx="0" cy="0"/>
+        </a:xfrm>
+      </p:grpSpPr>
+      <p:sp>
+        <p:nvSpPr>
+          <p:cNvPr id="2" name="Title 1"/>
+          <p:cNvSpPr>
+            <a:spLocks noGrp="1"/>
+          </p:cNvSpPr>
+          <p:nvPr>
+            <p:ph type="title"/>
+          </p:nvPr>
+        </p:nvSpPr>
+        <p:spPr/>
+        <p:txBody>
+          <a:bodyPr/>
+          <a:lstStyle/>
+          <a:p>
+            <a:r>
               <a:rPr lang="en-US" sz="4400" dirty="0" smtClean="0"/>
               <a:t>If we continued development…</a:t>
             </a:r>
@@ -4061,6 +4159,107 @@
             <p:ph type="title"/>
           </p:nvPr>
         </p:nvSpPr>
+        <p:spPr>
+          <a:xfrm>
+            <a:off x="457200" y="152400"/>
+            <a:ext cx="8229600" cy="1066800"/>
+          </a:xfrm>
+        </p:spPr>
+        <p:txBody>
+          <a:bodyPr/>
+          <a:lstStyle/>
+          <a:p>
+            <a:r>
+              <a:rPr lang="en-US" dirty="0" smtClean="0"/>
+              <a:t>Database Diagram</a:t>
+            </a:r>
+            <a:endParaRPr lang="en-US" dirty="0"/>
+          </a:p>
+        </p:txBody>
+      </p:sp>
+      <p:pic>
+        <p:nvPicPr>
+          <p:cNvPr id="1026" name="Picture 2" descr="C:\Users\bpasse.ZIROUS\Documents\GitHub\SEIS635Project\Documents\Database Relationship.png"/>
+          <p:cNvPicPr>
+            <a:picLocks noGrp="1" noChangeAspect="1" noChangeArrowheads="1"/>
+          </p:cNvPicPr>
+          <p:nvPr>
+            <p:ph idx="1"/>
+          </p:nvPr>
+        </p:nvPicPr>
+        <p:blipFill>
+          <a:blip r:embed="rId2">
+            <a:extLst>
+              <a:ext uri="{28A0092B-C50C-407E-A947-70E740481C1C}">
+                <a14:useLocalDpi xmlns:a14="http://schemas.microsoft.com/office/drawing/2010/main" val="0"/>
+              </a:ext>
+            </a:extLst>
+          </a:blip>
+          <a:srcRect/>
+          <a:stretch>
+            <a:fillRect/>
+          </a:stretch>
+        </p:blipFill>
+        <p:spPr bwMode="auto">
+          <a:xfrm>
+            <a:off x="152400" y="1283890"/>
+            <a:ext cx="8767790" cy="5116910"/>
+          </a:xfrm>
+          <a:prstGeom prst="rect">
+            <a:avLst/>
+          </a:prstGeom>
+          <a:noFill/>
+          <a:extLst>
+            <a:ext uri="{909E8E84-426E-40DD-AFC4-6F175D3DCCD1}">
+              <a14:hiddenFill xmlns:a14="http://schemas.microsoft.com/office/drawing/2010/main">
+                <a:solidFill>
+                  <a:srgbClr val="FFFFFF"/>
+                </a:solidFill>
+              </a14:hiddenFill>
+            </a:ext>
+          </a:extLst>
+        </p:spPr>
+      </p:pic>
+    </p:spTree>
+    <p:extLst>
+      <p:ext uri="{BB962C8B-B14F-4D97-AF65-F5344CB8AC3E}">
+        <p14:creationId xmlns:p14="http://schemas.microsoft.com/office/powerpoint/2010/main" val="596444046"/>
+      </p:ext>
+    </p:extLst>
+  </p:cSld>
+  <p:clrMapOvr>
+    <a:masterClrMapping/>
+  </p:clrMapOvr>
+</p:sld>
+</file>
+
+<file path=ppt/slides/slide8.xml><?xml version="1.0" encoding="utf-8"?>
+<p:sld xmlns:a="http://schemas.openxmlformats.org/drawingml/2006/main" xmlns:r="http://schemas.openxmlformats.org/officeDocument/2006/relationships" xmlns:p="http://schemas.openxmlformats.org/presentationml/2006/main">
+  <p:cSld>
+    <p:spTree>
+      <p:nvGrpSpPr>
+        <p:cNvPr id="1" name=""/>
+        <p:cNvGrpSpPr/>
+        <p:nvPr/>
+      </p:nvGrpSpPr>
+      <p:grpSpPr>
+        <a:xfrm>
+          <a:off x="0" y="0"/>
+          <a:ext cx="0" cy="0"/>
+          <a:chOff x="0" y="0"/>
+          <a:chExt cx="0" cy="0"/>
+        </a:xfrm>
+      </p:grpSpPr>
+      <p:sp>
+        <p:nvSpPr>
+          <p:cNvPr id="2" name="Title 1"/>
+          <p:cNvSpPr>
+            <a:spLocks noGrp="1"/>
+          </p:cNvSpPr>
+          <p:nvPr>
+            <p:ph type="title"/>
+          </p:nvPr>
+        </p:nvSpPr>
         <p:spPr/>
         <p:txBody>
           <a:bodyPr/>
@@ -4171,7 +4370,7 @@
 </p:sld>
 </file>
 
-<file path=ppt/slides/slide8.xml><?xml version="1.0" encoding="utf-8"?>
+<file path=ppt/slides/slide9.xml><?xml version="1.0" encoding="utf-8"?>
 <p:sld xmlns:a="http://schemas.openxmlformats.org/drawingml/2006/main" xmlns:r="http://schemas.openxmlformats.org/officeDocument/2006/relationships" xmlns:p="http://schemas.openxmlformats.org/presentationml/2006/main">
   <p:cSld>
     <p:spTree>
@@ -4242,7 +4441,7 @@
           </a:prstGeom>
           <a:noFill/>
           <a:extLst>
-            <a:ext uri="{909E8E84-426E-40dd-AFC4-6F175D3DCCD1}">
+            <a:ext uri="{909E8E84-426E-40DD-AFC4-6F175D3DCCD1}">
               <a14:hiddenFill xmlns:a14="http://schemas.microsoft.com/office/drawing/2010/main">
                 <a:solidFill>
                   <a:srgbClr val="FFFFFF"/>
@@ -4256,103 +4455,6 @@
     <p:extLst>
       <p:ext uri="{BB962C8B-B14F-4D97-AF65-F5344CB8AC3E}">
         <p14:creationId xmlns:p14="http://schemas.microsoft.com/office/powerpoint/2010/main" val="2111085227"/>
-      </p:ext>
-    </p:extLst>
-  </p:cSld>
-  <p:clrMapOvr>
-    <a:masterClrMapping/>
-  </p:clrMapOvr>
-</p:sld>
-</file>
-
-<file path=ppt/slides/slide9.xml><?xml version="1.0" encoding="utf-8"?>
-<p:sld xmlns:a="http://schemas.openxmlformats.org/drawingml/2006/main" xmlns:r="http://schemas.openxmlformats.org/officeDocument/2006/relationships" xmlns:p="http://schemas.openxmlformats.org/presentationml/2006/main">
-  <p:cSld>
-    <p:spTree>
-      <p:nvGrpSpPr>
-        <p:cNvPr id="1" name=""/>
-        <p:cNvGrpSpPr/>
-        <p:nvPr/>
-      </p:nvGrpSpPr>
-      <p:grpSpPr>
-        <a:xfrm>
-          <a:off x="0" y="0"/>
-          <a:ext cx="0" cy="0"/>
-          <a:chOff x="0" y="0"/>
-          <a:chExt cx="0" cy="0"/>
-        </a:xfrm>
-      </p:grpSpPr>
-      <p:sp>
-        <p:nvSpPr>
-          <p:cNvPr id="2" name="Title 1"/>
-          <p:cNvSpPr>
-            <a:spLocks noGrp="1"/>
-          </p:cNvSpPr>
-          <p:nvPr>
-            <p:ph type="title"/>
-          </p:nvPr>
-        </p:nvSpPr>
-        <p:spPr/>
-        <p:txBody>
-          <a:bodyPr/>
-          <a:lstStyle/>
-          <a:p>
-            <a:r>
-              <a:rPr lang="en-US" dirty="0" smtClean="0"/>
-              <a:t>Differently the Next Time</a:t>
-            </a:r>
-            <a:endParaRPr lang="en-US" dirty="0"/>
-          </a:p>
-        </p:txBody>
-      </p:sp>
-      <p:sp>
-        <p:nvSpPr>
-          <p:cNvPr id="3" name="Content Placeholder 2"/>
-          <p:cNvSpPr>
-            <a:spLocks noGrp="1"/>
-          </p:cNvSpPr>
-          <p:nvPr>
-            <p:ph idx="1"/>
-          </p:nvPr>
-        </p:nvSpPr>
-        <p:spPr/>
-        <p:txBody>
-          <a:bodyPr/>
-          <a:lstStyle/>
-          <a:p>
-            <a:endParaRPr lang="en-US" dirty="0" smtClean="0"/>
-          </a:p>
-          <a:p>
-            <a:r>
-              <a:rPr lang="en-US" dirty="0" smtClean="0"/>
-              <a:t>Choose application subject sooner</a:t>
-            </a:r>
-          </a:p>
-          <a:p>
-            <a:endParaRPr lang="en-US" dirty="0" smtClean="0"/>
-          </a:p>
-          <a:p>
-            <a:r>
-              <a:rPr lang="en-US" dirty="0" smtClean="0"/>
-              <a:t>Choose technology sooner</a:t>
-            </a:r>
-          </a:p>
-          <a:p>
-            <a:endParaRPr lang="en-US" dirty="0" smtClean="0"/>
-          </a:p>
-          <a:p>
-            <a:r>
-              <a:rPr lang="en-US" dirty="0" smtClean="0"/>
-              <a:t>Create web or mobile application</a:t>
-            </a:r>
-            <a:endParaRPr lang="en-US" dirty="0"/>
-          </a:p>
-        </p:txBody>
-      </p:sp>
-    </p:spTree>
-    <p:extLst>
-      <p:ext uri="{BB962C8B-B14F-4D97-AF65-F5344CB8AC3E}">
-        <p14:creationId xmlns:p14="http://schemas.microsoft.com/office/powerpoint/2010/main" val="1402356455"/>
       </p:ext>
     </p:extLst>
   </p:cSld>

</xml_diff>

<commit_message>
Add notes for presentation
</commit_message>
<xml_diff>
--- a/Documents/Presentation.pptx
+++ b/Documents/Presentation.pptx
@@ -4,6 +4,9 @@
   <p:sldMasterIdLst>
     <p:sldMasterId id="2147483708" r:id="rId1"/>
   </p:sldMasterIdLst>
+  <p:notesMasterIdLst>
+    <p:notesMasterId r:id="rId13"/>
+  </p:notesMasterIdLst>
   <p:sldIdLst>
     <p:sldId id="256" r:id="rId2"/>
     <p:sldId id="257" r:id="rId3"/>
@@ -117,6 +120,1457 @@
 </p:presentation>
 </file>
 
+<file path=ppt/notesMasters/notesMaster1.xml><?xml version="1.0" encoding="utf-8"?>
+<p:notesMaster xmlns:a="http://schemas.openxmlformats.org/drawingml/2006/main" xmlns:r="http://schemas.openxmlformats.org/officeDocument/2006/relationships" xmlns:p="http://schemas.openxmlformats.org/presentationml/2006/main">
+  <p:cSld>
+    <p:bg>
+      <p:bgRef idx="1001">
+        <a:schemeClr val="bg1"/>
+      </p:bgRef>
+    </p:bg>
+    <p:spTree>
+      <p:nvGrpSpPr>
+        <p:cNvPr id="1" name=""/>
+        <p:cNvGrpSpPr/>
+        <p:nvPr/>
+      </p:nvGrpSpPr>
+      <p:grpSpPr>
+        <a:xfrm>
+          <a:off x="0" y="0"/>
+          <a:ext cx="0" cy="0"/>
+          <a:chOff x="0" y="0"/>
+          <a:chExt cx="0" cy="0"/>
+        </a:xfrm>
+      </p:grpSpPr>
+      <p:sp>
+        <p:nvSpPr>
+          <p:cNvPr id="2" name="Header Placeholder 1"/>
+          <p:cNvSpPr>
+            <a:spLocks noGrp="1"/>
+          </p:cNvSpPr>
+          <p:nvPr>
+            <p:ph type="hdr" sz="quarter"/>
+          </p:nvPr>
+        </p:nvSpPr>
+        <p:spPr>
+          <a:xfrm>
+            <a:off x="0" y="0"/>
+            <a:ext cx="2971800" cy="457200"/>
+          </a:xfrm>
+          <a:prstGeom prst="rect">
+            <a:avLst/>
+          </a:prstGeom>
+        </p:spPr>
+        <p:txBody>
+          <a:bodyPr vert="horz" lIns="91440" tIns="45720" rIns="91440" bIns="45720" rtlCol="0"/>
+          <a:lstStyle>
+            <a:lvl1pPr algn="l">
+              <a:defRPr sz="1200"/>
+            </a:lvl1pPr>
+          </a:lstStyle>
+          <a:p>
+            <a:endParaRPr lang="en-US"/>
+          </a:p>
+        </p:txBody>
+      </p:sp>
+      <p:sp>
+        <p:nvSpPr>
+          <p:cNvPr id="3" name="Date Placeholder 2"/>
+          <p:cNvSpPr>
+            <a:spLocks noGrp="1"/>
+          </p:cNvSpPr>
+          <p:nvPr>
+            <p:ph type="dt" idx="1"/>
+          </p:nvPr>
+        </p:nvSpPr>
+        <p:spPr>
+          <a:xfrm>
+            <a:off x="3884613" y="0"/>
+            <a:ext cx="2971800" cy="457200"/>
+          </a:xfrm>
+          <a:prstGeom prst="rect">
+            <a:avLst/>
+          </a:prstGeom>
+        </p:spPr>
+        <p:txBody>
+          <a:bodyPr vert="horz" lIns="91440" tIns="45720" rIns="91440" bIns="45720" rtlCol="0"/>
+          <a:lstStyle>
+            <a:lvl1pPr algn="r">
+              <a:defRPr sz="1200"/>
+            </a:lvl1pPr>
+          </a:lstStyle>
+          <a:p>
+            <a:fld id="{AD0948CF-B3EA-4F51-820A-D16BE8431FC5}" type="datetimeFigureOut">
+              <a:rPr lang="en-US" smtClean="0"/>
+              <a:t>5/17/2013</a:t>
+            </a:fld>
+            <a:endParaRPr lang="en-US"/>
+          </a:p>
+        </p:txBody>
+      </p:sp>
+      <p:sp>
+        <p:nvSpPr>
+          <p:cNvPr id="4" name="Slide Image Placeholder 3"/>
+          <p:cNvSpPr>
+            <a:spLocks noGrp="1" noRot="1" noChangeAspect="1"/>
+          </p:cNvSpPr>
+          <p:nvPr>
+            <p:ph type="sldImg" idx="2"/>
+          </p:nvPr>
+        </p:nvSpPr>
+        <p:spPr>
+          <a:xfrm>
+            <a:off x="1143000" y="685800"/>
+            <a:ext cx="4572000" cy="3429000"/>
+          </a:xfrm>
+          <a:prstGeom prst="rect">
+            <a:avLst/>
+          </a:prstGeom>
+          <a:noFill/>
+          <a:ln w="12700">
+            <a:solidFill>
+              <a:prstClr val="black"/>
+            </a:solidFill>
+          </a:ln>
+        </p:spPr>
+        <p:txBody>
+          <a:bodyPr vert="horz" lIns="91440" tIns="45720" rIns="91440" bIns="45720" rtlCol="0" anchor="ctr"/>
+          <a:lstStyle/>
+          <a:p>
+            <a:endParaRPr lang="en-US"/>
+          </a:p>
+        </p:txBody>
+      </p:sp>
+      <p:sp>
+        <p:nvSpPr>
+          <p:cNvPr id="5" name="Notes Placeholder 4"/>
+          <p:cNvSpPr>
+            <a:spLocks noGrp="1"/>
+          </p:cNvSpPr>
+          <p:nvPr>
+            <p:ph type="body" sz="quarter" idx="3"/>
+          </p:nvPr>
+        </p:nvSpPr>
+        <p:spPr>
+          <a:xfrm>
+            <a:off x="685800" y="4343400"/>
+            <a:ext cx="5486400" cy="4114800"/>
+          </a:xfrm>
+          <a:prstGeom prst="rect">
+            <a:avLst/>
+          </a:prstGeom>
+        </p:spPr>
+        <p:txBody>
+          <a:bodyPr vert="horz" lIns="91440" tIns="45720" rIns="91440" bIns="45720" rtlCol="0"/>
+          <a:lstStyle/>
+          <a:p>
+            <a:pPr lvl="0"/>
+            <a:r>
+              <a:rPr lang="en-US" smtClean="0"/>
+              <a:t>Click to edit Master text styles</a:t>
+            </a:r>
+          </a:p>
+          <a:p>
+            <a:pPr lvl="1"/>
+            <a:r>
+              <a:rPr lang="en-US" smtClean="0"/>
+              <a:t>Second level</a:t>
+            </a:r>
+          </a:p>
+          <a:p>
+            <a:pPr lvl="2"/>
+            <a:r>
+              <a:rPr lang="en-US" smtClean="0"/>
+              <a:t>Third level</a:t>
+            </a:r>
+          </a:p>
+          <a:p>
+            <a:pPr lvl="3"/>
+            <a:r>
+              <a:rPr lang="en-US" smtClean="0"/>
+              <a:t>Fourth level</a:t>
+            </a:r>
+          </a:p>
+          <a:p>
+            <a:pPr lvl="4"/>
+            <a:r>
+              <a:rPr lang="en-US" smtClean="0"/>
+              <a:t>Fifth level</a:t>
+            </a:r>
+            <a:endParaRPr lang="en-US"/>
+          </a:p>
+        </p:txBody>
+      </p:sp>
+      <p:sp>
+        <p:nvSpPr>
+          <p:cNvPr id="6" name="Footer Placeholder 5"/>
+          <p:cNvSpPr>
+            <a:spLocks noGrp="1"/>
+          </p:cNvSpPr>
+          <p:nvPr>
+            <p:ph type="ftr" sz="quarter" idx="4"/>
+          </p:nvPr>
+        </p:nvSpPr>
+        <p:spPr>
+          <a:xfrm>
+            <a:off x="0" y="8685213"/>
+            <a:ext cx="2971800" cy="457200"/>
+          </a:xfrm>
+          <a:prstGeom prst="rect">
+            <a:avLst/>
+          </a:prstGeom>
+        </p:spPr>
+        <p:txBody>
+          <a:bodyPr vert="horz" lIns="91440" tIns="45720" rIns="91440" bIns="45720" rtlCol="0" anchor="b"/>
+          <a:lstStyle>
+            <a:lvl1pPr algn="l">
+              <a:defRPr sz="1200"/>
+            </a:lvl1pPr>
+          </a:lstStyle>
+          <a:p>
+            <a:endParaRPr lang="en-US"/>
+          </a:p>
+        </p:txBody>
+      </p:sp>
+      <p:sp>
+        <p:nvSpPr>
+          <p:cNvPr id="7" name="Slide Number Placeholder 6"/>
+          <p:cNvSpPr>
+            <a:spLocks noGrp="1"/>
+          </p:cNvSpPr>
+          <p:nvPr>
+            <p:ph type="sldNum" sz="quarter" idx="5"/>
+          </p:nvPr>
+        </p:nvSpPr>
+        <p:spPr>
+          <a:xfrm>
+            <a:off x="3884613" y="8685213"/>
+            <a:ext cx="2971800" cy="457200"/>
+          </a:xfrm>
+          <a:prstGeom prst="rect">
+            <a:avLst/>
+          </a:prstGeom>
+        </p:spPr>
+        <p:txBody>
+          <a:bodyPr vert="horz" lIns="91440" tIns="45720" rIns="91440" bIns="45720" rtlCol="0" anchor="b"/>
+          <a:lstStyle>
+            <a:lvl1pPr algn="r">
+              <a:defRPr sz="1200"/>
+            </a:lvl1pPr>
+          </a:lstStyle>
+          <a:p>
+            <a:fld id="{A1D1CA84-32C6-4521-9E5B-9BE0C93F27F7}" type="slidenum">
+              <a:rPr lang="en-US" smtClean="0"/>
+              <a:t>‹#›</a:t>
+            </a:fld>
+            <a:endParaRPr lang="en-US"/>
+          </a:p>
+        </p:txBody>
+      </p:sp>
+    </p:spTree>
+    <p:extLst>
+      <p:ext uri="{BB962C8B-B14F-4D97-AF65-F5344CB8AC3E}">
+        <p14:creationId xmlns:p14="http://schemas.microsoft.com/office/powerpoint/2010/main" val="796490509"/>
+      </p:ext>
+    </p:extLst>
+  </p:cSld>
+  <p:clrMap bg1="lt1" tx1="dk1" bg2="lt2" tx2="dk2" accent1="accent1" accent2="accent2" accent3="accent3" accent4="accent4" accent5="accent5" accent6="accent6" hlink="hlink" folHlink="folHlink"/>
+  <p:notesStyle>
+    <a:lvl1pPr marL="0" algn="l" defTabSz="914400" rtl="0" eaLnBrk="1" latinLnBrk="0" hangingPunct="1">
+      <a:defRPr sz="1200" kern="1200">
+        <a:solidFill>
+          <a:schemeClr val="tx1"/>
+        </a:solidFill>
+        <a:latin typeface="+mn-lt"/>
+        <a:ea typeface="+mn-ea"/>
+        <a:cs typeface="+mn-cs"/>
+      </a:defRPr>
+    </a:lvl1pPr>
+    <a:lvl2pPr marL="457200" algn="l" defTabSz="914400" rtl="0" eaLnBrk="1" latinLnBrk="0" hangingPunct="1">
+      <a:defRPr sz="1200" kern="1200">
+        <a:solidFill>
+          <a:schemeClr val="tx1"/>
+        </a:solidFill>
+        <a:latin typeface="+mn-lt"/>
+        <a:ea typeface="+mn-ea"/>
+        <a:cs typeface="+mn-cs"/>
+      </a:defRPr>
+    </a:lvl2pPr>
+    <a:lvl3pPr marL="914400" algn="l" defTabSz="914400" rtl="0" eaLnBrk="1" latinLnBrk="0" hangingPunct="1">
+      <a:defRPr sz="1200" kern="1200">
+        <a:solidFill>
+          <a:schemeClr val="tx1"/>
+        </a:solidFill>
+        <a:latin typeface="+mn-lt"/>
+        <a:ea typeface="+mn-ea"/>
+        <a:cs typeface="+mn-cs"/>
+      </a:defRPr>
+    </a:lvl3pPr>
+    <a:lvl4pPr marL="1371600" algn="l" defTabSz="914400" rtl="0" eaLnBrk="1" latinLnBrk="0" hangingPunct="1">
+      <a:defRPr sz="1200" kern="1200">
+        <a:solidFill>
+          <a:schemeClr val="tx1"/>
+        </a:solidFill>
+        <a:latin typeface="+mn-lt"/>
+        <a:ea typeface="+mn-ea"/>
+        <a:cs typeface="+mn-cs"/>
+      </a:defRPr>
+    </a:lvl4pPr>
+    <a:lvl5pPr marL="1828800" algn="l" defTabSz="914400" rtl="0" eaLnBrk="1" latinLnBrk="0" hangingPunct="1">
+      <a:defRPr sz="1200" kern="1200">
+        <a:solidFill>
+          <a:schemeClr val="tx1"/>
+        </a:solidFill>
+        <a:latin typeface="+mn-lt"/>
+        <a:ea typeface="+mn-ea"/>
+        <a:cs typeface="+mn-cs"/>
+      </a:defRPr>
+    </a:lvl5pPr>
+    <a:lvl6pPr marL="2286000" algn="l" defTabSz="914400" rtl="0" eaLnBrk="1" latinLnBrk="0" hangingPunct="1">
+      <a:defRPr sz="1200" kern="1200">
+        <a:solidFill>
+          <a:schemeClr val="tx1"/>
+        </a:solidFill>
+        <a:latin typeface="+mn-lt"/>
+        <a:ea typeface="+mn-ea"/>
+        <a:cs typeface="+mn-cs"/>
+      </a:defRPr>
+    </a:lvl6pPr>
+    <a:lvl7pPr marL="2743200" algn="l" defTabSz="914400" rtl="0" eaLnBrk="1" latinLnBrk="0" hangingPunct="1">
+      <a:defRPr sz="1200" kern="1200">
+        <a:solidFill>
+          <a:schemeClr val="tx1"/>
+        </a:solidFill>
+        <a:latin typeface="+mn-lt"/>
+        <a:ea typeface="+mn-ea"/>
+        <a:cs typeface="+mn-cs"/>
+      </a:defRPr>
+    </a:lvl7pPr>
+    <a:lvl8pPr marL="3200400" algn="l" defTabSz="914400" rtl="0" eaLnBrk="1" latinLnBrk="0" hangingPunct="1">
+      <a:defRPr sz="1200" kern="1200">
+        <a:solidFill>
+          <a:schemeClr val="tx1"/>
+        </a:solidFill>
+        <a:latin typeface="+mn-lt"/>
+        <a:ea typeface="+mn-ea"/>
+        <a:cs typeface="+mn-cs"/>
+      </a:defRPr>
+    </a:lvl8pPr>
+    <a:lvl9pPr marL="3657600" algn="l" defTabSz="914400" rtl="0" eaLnBrk="1" latinLnBrk="0" hangingPunct="1">
+      <a:defRPr sz="1200" kern="1200">
+        <a:solidFill>
+          <a:schemeClr val="tx1"/>
+        </a:solidFill>
+        <a:latin typeface="+mn-lt"/>
+        <a:ea typeface="+mn-ea"/>
+        <a:cs typeface="+mn-cs"/>
+      </a:defRPr>
+    </a:lvl9pPr>
+  </p:notesStyle>
+</p:notesMaster>
+</file>
+
+<file path=ppt/notesSlides/notesSlide1.xml><?xml version="1.0" encoding="utf-8"?>
+<p:notes xmlns:a="http://schemas.openxmlformats.org/drawingml/2006/main" xmlns:r="http://schemas.openxmlformats.org/officeDocument/2006/relationships" xmlns:p="http://schemas.openxmlformats.org/presentationml/2006/main">
+  <p:cSld>
+    <p:spTree>
+      <p:nvGrpSpPr>
+        <p:cNvPr id="1" name=""/>
+        <p:cNvGrpSpPr/>
+        <p:nvPr/>
+      </p:nvGrpSpPr>
+      <p:grpSpPr>
+        <a:xfrm>
+          <a:off x="0" y="0"/>
+          <a:ext cx="0" cy="0"/>
+          <a:chOff x="0" y="0"/>
+          <a:chExt cx="0" cy="0"/>
+        </a:xfrm>
+      </p:grpSpPr>
+      <p:sp>
+        <p:nvSpPr>
+          <p:cNvPr id="2" name="Slide Image Placeholder 1"/>
+          <p:cNvSpPr>
+            <a:spLocks noGrp="1" noRot="1" noChangeAspect="1"/>
+          </p:cNvSpPr>
+          <p:nvPr>
+            <p:ph type="sldImg"/>
+          </p:nvPr>
+        </p:nvSpPr>
+        <p:spPr/>
+      </p:sp>
+      <p:sp>
+        <p:nvSpPr>
+          <p:cNvPr id="3" name="Notes Placeholder 2"/>
+          <p:cNvSpPr>
+            <a:spLocks noGrp="1"/>
+          </p:cNvSpPr>
+          <p:nvPr>
+            <p:ph type="body" idx="1"/>
+          </p:nvPr>
+        </p:nvSpPr>
+        <p:spPr/>
+        <p:txBody>
+          <a:bodyPr/>
+          <a:lstStyle/>
+          <a:p>
+            <a:r>
+              <a:rPr lang="en-US" dirty="0" smtClean="0"/>
+              <a:t>Ben</a:t>
+            </a:r>
+            <a:endParaRPr lang="en-US" dirty="0"/>
+          </a:p>
+        </p:txBody>
+      </p:sp>
+      <p:sp>
+        <p:nvSpPr>
+          <p:cNvPr id="4" name="Slide Number Placeholder 3"/>
+          <p:cNvSpPr>
+            <a:spLocks noGrp="1"/>
+          </p:cNvSpPr>
+          <p:nvPr>
+            <p:ph type="sldNum" sz="quarter" idx="10"/>
+          </p:nvPr>
+        </p:nvSpPr>
+        <p:spPr/>
+        <p:txBody>
+          <a:bodyPr/>
+          <a:lstStyle/>
+          <a:p>
+            <a:fld id="{A1D1CA84-32C6-4521-9E5B-9BE0C93F27F7}" type="slidenum">
+              <a:rPr lang="en-US" smtClean="0"/>
+              <a:t>1</a:t>
+            </a:fld>
+            <a:endParaRPr lang="en-US"/>
+          </a:p>
+        </p:txBody>
+      </p:sp>
+    </p:spTree>
+    <p:extLst>
+      <p:ext uri="{BB962C8B-B14F-4D97-AF65-F5344CB8AC3E}">
+        <p14:creationId xmlns:p14="http://schemas.microsoft.com/office/powerpoint/2010/main" val="187420277"/>
+      </p:ext>
+    </p:extLst>
+  </p:cSld>
+  <p:clrMapOvr>
+    <a:masterClrMapping/>
+  </p:clrMapOvr>
+</p:notes>
+</file>
+
+<file path=ppt/notesSlides/notesSlide10.xml><?xml version="1.0" encoding="utf-8"?>
+<p:notes xmlns:a="http://schemas.openxmlformats.org/drawingml/2006/main" xmlns:r="http://schemas.openxmlformats.org/officeDocument/2006/relationships" xmlns:p="http://schemas.openxmlformats.org/presentationml/2006/main">
+  <p:cSld>
+    <p:spTree>
+      <p:nvGrpSpPr>
+        <p:cNvPr id="1" name=""/>
+        <p:cNvGrpSpPr/>
+        <p:nvPr/>
+      </p:nvGrpSpPr>
+      <p:grpSpPr>
+        <a:xfrm>
+          <a:off x="0" y="0"/>
+          <a:ext cx="0" cy="0"/>
+          <a:chOff x="0" y="0"/>
+          <a:chExt cx="0" cy="0"/>
+        </a:xfrm>
+      </p:grpSpPr>
+      <p:sp>
+        <p:nvSpPr>
+          <p:cNvPr id="2" name="Slide Image Placeholder 1"/>
+          <p:cNvSpPr>
+            <a:spLocks noGrp="1" noRot="1" noChangeAspect="1"/>
+          </p:cNvSpPr>
+          <p:nvPr>
+            <p:ph type="sldImg"/>
+          </p:nvPr>
+        </p:nvSpPr>
+        <p:spPr/>
+      </p:sp>
+      <p:sp>
+        <p:nvSpPr>
+          <p:cNvPr id="3" name="Notes Placeholder 2"/>
+          <p:cNvSpPr>
+            <a:spLocks noGrp="1"/>
+          </p:cNvSpPr>
+          <p:nvPr>
+            <p:ph type="body" idx="1"/>
+          </p:nvPr>
+        </p:nvSpPr>
+        <p:spPr/>
+        <p:txBody>
+          <a:bodyPr/>
+          <a:lstStyle/>
+          <a:p>
+            <a:pPr marL="0" marR="0" indent="0" algn="l" defTabSz="914400" rtl="0" eaLnBrk="1" fontAlgn="auto" latinLnBrk="0" hangingPunct="1">
+              <a:lnSpc>
+                <a:spcPct val="100000"/>
+              </a:lnSpc>
+              <a:spcBef>
+                <a:spcPts val="0"/>
+              </a:spcBef>
+              <a:spcAft>
+                <a:spcPts val="0"/>
+              </a:spcAft>
+              <a:buClrTx/>
+              <a:buSzTx/>
+              <a:buFontTx/>
+              <a:buNone/>
+              <a:tabLst/>
+              <a:defRPr/>
+            </a:pPr>
+            <a:r>
+              <a:rPr lang="en-US" dirty="0" smtClean="0"/>
+              <a:t>Ben</a:t>
+            </a:r>
+          </a:p>
+          <a:p>
+            <a:endParaRPr lang="en-US" dirty="0"/>
+          </a:p>
+        </p:txBody>
+      </p:sp>
+      <p:sp>
+        <p:nvSpPr>
+          <p:cNvPr id="4" name="Slide Number Placeholder 3"/>
+          <p:cNvSpPr>
+            <a:spLocks noGrp="1"/>
+          </p:cNvSpPr>
+          <p:nvPr>
+            <p:ph type="sldNum" sz="quarter" idx="10"/>
+          </p:nvPr>
+        </p:nvSpPr>
+        <p:spPr/>
+        <p:txBody>
+          <a:bodyPr/>
+          <a:lstStyle/>
+          <a:p>
+            <a:fld id="{A1D1CA84-32C6-4521-9E5B-9BE0C93F27F7}" type="slidenum">
+              <a:rPr lang="en-US" smtClean="0"/>
+              <a:t>10</a:t>
+            </a:fld>
+            <a:endParaRPr lang="en-US"/>
+          </a:p>
+        </p:txBody>
+      </p:sp>
+    </p:spTree>
+    <p:extLst>
+      <p:ext uri="{BB962C8B-B14F-4D97-AF65-F5344CB8AC3E}">
+        <p14:creationId xmlns:p14="http://schemas.microsoft.com/office/powerpoint/2010/main" val="3890245858"/>
+      </p:ext>
+    </p:extLst>
+  </p:cSld>
+  <p:clrMapOvr>
+    <a:masterClrMapping/>
+  </p:clrMapOvr>
+</p:notes>
+</file>
+
+<file path=ppt/notesSlides/notesSlide11.xml><?xml version="1.0" encoding="utf-8"?>
+<p:notes xmlns:a="http://schemas.openxmlformats.org/drawingml/2006/main" xmlns:r="http://schemas.openxmlformats.org/officeDocument/2006/relationships" xmlns:p="http://schemas.openxmlformats.org/presentationml/2006/main">
+  <p:cSld>
+    <p:spTree>
+      <p:nvGrpSpPr>
+        <p:cNvPr id="1" name=""/>
+        <p:cNvGrpSpPr/>
+        <p:nvPr/>
+      </p:nvGrpSpPr>
+      <p:grpSpPr>
+        <a:xfrm>
+          <a:off x="0" y="0"/>
+          <a:ext cx="0" cy="0"/>
+          <a:chOff x="0" y="0"/>
+          <a:chExt cx="0" cy="0"/>
+        </a:xfrm>
+      </p:grpSpPr>
+      <p:sp>
+        <p:nvSpPr>
+          <p:cNvPr id="2" name="Slide Image Placeholder 1"/>
+          <p:cNvSpPr>
+            <a:spLocks noGrp="1" noRot="1" noChangeAspect="1"/>
+          </p:cNvSpPr>
+          <p:nvPr>
+            <p:ph type="sldImg"/>
+          </p:nvPr>
+        </p:nvSpPr>
+        <p:spPr/>
+      </p:sp>
+      <p:sp>
+        <p:nvSpPr>
+          <p:cNvPr id="3" name="Notes Placeholder 2"/>
+          <p:cNvSpPr>
+            <a:spLocks noGrp="1"/>
+          </p:cNvSpPr>
+          <p:nvPr>
+            <p:ph type="body" idx="1"/>
+          </p:nvPr>
+        </p:nvSpPr>
+        <p:spPr/>
+        <p:txBody>
+          <a:bodyPr/>
+          <a:lstStyle/>
+          <a:p>
+            <a:pPr marL="0" marR="0" indent="0" algn="l" defTabSz="914400" rtl="0" eaLnBrk="1" fontAlgn="auto" latinLnBrk="0" hangingPunct="1">
+              <a:lnSpc>
+                <a:spcPct val="100000"/>
+              </a:lnSpc>
+              <a:spcBef>
+                <a:spcPts val="0"/>
+              </a:spcBef>
+              <a:spcAft>
+                <a:spcPts val="0"/>
+              </a:spcAft>
+              <a:buClrTx/>
+              <a:buSzTx/>
+              <a:buFontTx/>
+              <a:buNone/>
+              <a:tabLst/>
+              <a:defRPr/>
+            </a:pPr>
+            <a:r>
+              <a:rPr lang="en-US" smtClean="0"/>
+              <a:t>Ben</a:t>
+            </a:r>
+          </a:p>
+          <a:p>
+            <a:endParaRPr lang="en-US"/>
+          </a:p>
+        </p:txBody>
+      </p:sp>
+      <p:sp>
+        <p:nvSpPr>
+          <p:cNvPr id="4" name="Slide Number Placeholder 3"/>
+          <p:cNvSpPr>
+            <a:spLocks noGrp="1"/>
+          </p:cNvSpPr>
+          <p:nvPr>
+            <p:ph type="sldNum" sz="quarter" idx="10"/>
+          </p:nvPr>
+        </p:nvSpPr>
+        <p:spPr/>
+        <p:txBody>
+          <a:bodyPr/>
+          <a:lstStyle/>
+          <a:p>
+            <a:fld id="{A1D1CA84-32C6-4521-9E5B-9BE0C93F27F7}" type="slidenum">
+              <a:rPr lang="en-US" smtClean="0"/>
+              <a:t>11</a:t>
+            </a:fld>
+            <a:endParaRPr lang="en-US"/>
+          </a:p>
+        </p:txBody>
+      </p:sp>
+    </p:spTree>
+    <p:extLst>
+      <p:ext uri="{BB962C8B-B14F-4D97-AF65-F5344CB8AC3E}">
+        <p14:creationId xmlns:p14="http://schemas.microsoft.com/office/powerpoint/2010/main" val="3872527527"/>
+      </p:ext>
+    </p:extLst>
+  </p:cSld>
+  <p:clrMapOvr>
+    <a:masterClrMapping/>
+  </p:clrMapOvr>
+</p:notes>
+</file>
+
+<file path=ppt/notesSlides/notesSlide2.xml><?xml version="1.0" encoding="utf-8"?>
+<p:notes xmlns:a="http://schemas.openxmlformats.org/drawingml/2006/main" xmlns:r="http://schemas.openxmlformats.org/officeDocument/2006/relationships" xmlns:p="http://schemas.openxmlformats.org/presentationml/2006/main">
+  <p:cSld>
+    <p:spTree>
+      <p:nvGrpSpPr>
+        <p:cNvPr id="1" name=""/>
+        <p:cNvGrpSpPr/>
+        <p:nvPr/>
+      </p:nvGrpSpPr>
+      <p:grpSpPr>
+        <a:xfrm>
+          <a:off x="0" y="0"/>
+          <a:ext cx="0" cy="0"/>
+          <a:chOff x="0" y="0"/>
+          <a:chExt cx="0" cy="0"/>
+        </a:xfrm>
+      </p:grpSpPr>
+      <p:sp>
+        <p:nvSpPr>
+          <p:cNvPr id="2" name="Slide Image Placeholder 1"/>
+          <p:cNvSpPr>
+            <a:spLocks noGrp="1" noRot="1" noChangeAspect="1"/>
+          </p:cNvSpPr>
+          <p:nvPr>
+            <p:ph type="sldImg"/>
+          </p:nvPr>
+        </p:nvSpPr>
+        <p:spPr/>
+      </p:sp>
+      <p:sp>
+        <p:nvSpPr>
+          <p:cNvPr id="3" name="Notes Placeholder 2"/>
+          <p:cNvSpPr>
+            <a:spLocks noGrp="1"/>
+          </p:cNvSpPr>
+          <p:nvPr>
+            <p:ph type="body" idx="1"/>
+          </p:nvPr>
+        </p:nvSpPr>
+        <p:spPr/>
+        <p:txBody>
+          <a:bodyPr/>
+          <a:lstStyle/>
+          <a:p>
+            <a:pPr marL="0" marR="0" indent="0" algn="l" defTabSz="914400" rtl="0" eaLnBrk="1" fontAlgn="auto" latinLnBrk="0" hangingPunct="1">
+              <a:lnSpc>
+                <a:spcPct val="100000"/>
+              </a:lnSpc>
+              <a:spcBef>
+                <a:spcPts val="0"/>
+              </a:spcBef>
+              <a:spcAft>
+                <a:spcPts val="0"/>
+              </a:spcAft>
+              <a:buClrTx/>
+              <a:buSzTx/>
+              <a:buFontTx/>
+              <a:buNone/>
+              <a:tabLst/>
+              <a:defRPr/>
+            </a:pPr>
+            <a:r>
+              <a:rPr lang="en-US" dirty="0" smtClean="0"/>
+              <a:t>Ben</a:t>
+            </a:r>
+          </a:p>
+          <a:p>
+            <a:endParaRPr lang="en-US" dirty="0"/>
+          </a:p>
+        </p:txBody>
+      </p:sp>
+      <p:sp>
+        <p:nvSpPr>
+          <p:cNvPr id="4" name="Slide Number Placeholder 3"/>
+          <p:cNvSpPr>
+            <a:spLocks noGrp="1"/>
+          </p:cNvSpPr>
+          <p:nvPr>
+            <p:ph type="sldNum" sz="quarter" idx="10"/>
+          </p:nvPr>
+        </p:nvSpPr>
+        <p:spPr/>
+        <p:txBody>
+          <a:bodyPr/>
+          <a:lstStyle/>
+          <a:p>
+            <a:fld id="{A1D1CA84-32C6-4521-9E5B-9BE0C93F27F7}" type="slidenum">
+              <a:rPr lang="en-US" smtClean="0"/>
+              <a:t>2</a:t>
+            </a:fld>
+            <a:endParaRPr lang="en-US"/>
+          </a:p>
+        </p:txBody>
+      </p:sp>
+    </p:spTree>
+    <p:extLst>
+      <p:ext uri="{BB962C8B-B14F-4D97-AF65-F5344CB8AC3E}">
+        <p14:creationId xmlns:p14="http://schemas.microsoft.com/office/powerpoint/2010/main" val="629005658"/>
+      </p:ext>
+    </p:extLst>
+  </p:cSld>
+  <p:clrMapOvr>
+    <a:masterClrMapping/>
+  </p:clrMapOvr>
+</p:notes>
+</file>
+
+<file path=ppt/notesSlides/notesSlide3.xml><?xml version="1.0" encoding="utf-8"?>
+<p:notes xmlns:a="http://schemas.openxmlformats.org/drawingml/2006/main" xmlns:r="http://schemas.openxmlformats.org/officeDocument/2006/relationships" xmlns:p="http://schemas.openxmlformats.org/presentationml/2006/main">
+  <p:cSld>
+    <p:spTree>
+      <p:nvGrpSpPr>
+        <p:cNvPr id="1" name=""/>
+        <p:cNvGrpSpPr/>
+        <p:nvPr/>
+      </p:nvGrpSpPr>
+      <p:grpSpPr>
+        <a:xfrm>
+          <a:off x="0" y="0"/>
+          <a:ext cx="0" cy="0"/>
+          <a:chOff x="0" y="0"/>
+          <a:chExt cx="0" cy="0"/>
+        </a:xfrm>
+      </p:grpSpPr>
+      <p:sp>
+        <p:nvSpPr>
+          <p:cNvPr id="2" name="Slide Image Placeholder 1"/>
+          <p:cNvSpPr>
+            <a:spLocks noGrp="1" noRot="1" noChangeAspect="1"/>
+          </p:cNvSpPr>
+          <p:nvPr>
+            <p:ph type="sldImg"/>
+          </p:nvPr>
+        </p:nvSpPr>
+        <p:spPr/>
+      </p:sp>
+      <p:sp>
+        <p:nvSpPr>
+          <p:cNvPr id="3" name="Notes Placeholder 2"/>
+          <p:cNvSpPr>
+            <a:spLocks noGrp="1"/>
+          </p:cNvSpPr>
+          <p:nvPr>
+            <p:ph type="body" idx="1"/>
+          </p:nvPr>
+        </p:nvSpPr>
+        <p:spPr/>
+        <p:txBody>
+          <a:bodyPr/>
+          <a:lstStyle/>
+          <a:p>
+            <a:pPr marL="0" marR="0" indent="0" algn="l" defTabSz="914400" rtl="0" eaLnBrk="1" fontAlgn="auto" latinLnBrk="0" hangingPunct="1">
+              <a:lnSpc>
+                <a:spcPct val="100000"/>
+              </a:lnSpc>
+              <a:spcBef>
+                <a:spcPts val="0"/>
+              </a:spcBef>
+              <a:spcAft>
+                <a:spcPts val="0"/>
+              </a:spcAft>
+              <a:buClrTx/>
+              <a:buSzTx/>
+              <a:buFontTx/>
+              <a:buNone/>
+              <a:tabLst/>
+              <a:defRPr/>
+            </a:pPr>
+            <a:r>
+              <a:rPr lang="en-US" dirty="0" smtClean="0"/>
+              <a:t>Ross</a:t>
+            </a:r>
+          </a:p>
+          <a:p>
+            <a:endParaRPr lang="en-US" dirty="0"/>
+          </a:p>
+        </p:txBody>
+      </p:sp>
+      <p:sp>
+        <p:nvSpPr>
+          <p:cNvPr id="4" name="Slide Number Placeholder 3"/>
+          <p:cNvSpPr>
+            <a:spLocks noGrp="1"/>
+          </p:cNvSpPr>
+          <p:nvPr>
+            <p:ph type="sldNum" sz="quarter" idx="10"/>
+          </p:nvPr>
+        </p:nvSpPr>
+        <p:spPr/>
+        <p:txBody>
+          <a:bodyPr/>
+          <a:lstStyle/>
+          <a:p>
+            <a:fld id="{A1D1CA84-32C6-4521-9E5B-9BE0C93F27F7}" type="slidenum">
+              <a:rPr lang="en-US" smtClean="0"/>
+              <a:t>3</a:t>
+            </a:fld>
+            <a:endParaRPr lang="en-US"/>
+          </a:p>
+        </p:txBody>
+      </p:sp>
+    </p:spTree>
+    <p:extLst>
+      <p:ext uri="{BB962C8B-B14F-4D97-AF65-F5344CB8AC3E}">
+        <p14:creationId xmlns:p14="http://schemas.microsoft.com/office/powerpoint/2010/main" val="664443056"/>
+      </p:ext>
+    </p:extLst>
+  </p:cSld>
+  <p:clrMapOvr>
+    <a:masterClrMapping/>
+  </p:clrMapOvr>
+</p:notes>
+</file>
+
+<file path=ppt/notesSlides/notesSlide4.xml><?xml version="1.0" encoding="utf-8"?>
+<p:notes xmlns:a="http://schemas.openxmlformats.org/drawingml/2006/main" xmlns:r="http://schemas.openxmlformats.org/officeDocument/2006/relationships" xmlns:p="http://schemas.openxmlformats.org/presentationml/2006/main">
+  <p:cSld>
+    <p:spTree>
+      <p:nvGrpSpPr>
+        <p:cNvPr id="1" name=""/>
+        <p:cNvGrpSpPr/>
+        <p:nvPr/>
+      </p:nvGrpSpPr>
+      <p:grpSpPr>
+        <a:xfrm>
+          <a:off x="0" y="0"/>
+          <a:ext cx="0" cy="0"/>
+          <a:chOff x="0" y="0"/>
+          <a:chExt cx="0" cy="0"/>
+        </a:xfrm>
+      </p:grpSpPr>
+      <p:sp>
+        <p:nvSpPr>
+          <p:cNvPr id="2" name="Slide Image Placeholder 1"/>
+          <p:cNvSpPr>
+            <a:spLocks noGrp="1" noRot="1" noChangeAspect="1"/>
+          </p:cNvSpPr>
+          <p:nvPr>
+            <p:ph type="sldImg"/>
+          </p:nvPr>
+        </p:nvSpPr>
+        <p:spPr/>
+      </p:sp>
+      <p:sp>
+        <p:nvSpPr>
+          <p:cNvPr id="3" name="Notes Placeholder 2"/>
+          <p:cNvSpPr>
+            <a:spLocks noGrp="1"/>
+          </p:cNvSpPr>
+          <p:nvPr>
+            <p:ph type="body" idx="1"/>
+          </p:nvPr>
+        </p:nvSpPr>
+        <p:spPr/>
+        <p:txBody>
+          <a:bodyPr/>
+          <a:lstStyle/>
+          <a:p>
+            <a:pPr marL="0" marR="0" indent="0" algn="l" defTabSz="914400" rtl="0" eaLnBrk="1" fontAlgn="auto" latinLnBrk="0" hangingPunct="1">
+              <a:lnSpc>
+                <a:spcPct val="100000"/>
+              </a:lnSpc>
+              <a:spcBef>
+                <a:spcPts val="0"/>
+              </a:spcBef>
+              <a:spcAft>
+                <a:spcPts val="0"/>
+              </a:spcAft>
+              <a:buClrTx/>
+              <a:buSzTx/>
+              <a:buFontTx/>
+              <a:buNone/>
+              <a:tabLst/>
+              <a:defRPr/>
+            </a:pPr>
+            <a:r>
+              <a:rPr lang="en-US" dirty="0" smtClean="0"/>
+              <a:t>Ben</a:t>
+            </a:r>
+          </a:p>
+          <a:p>
+            <a:endParaRPr lang="en-US" dirty="0"/>
+          </a:p>
+        </p:txBody>
+      </p:sp>
+      <p:sp>
+        <p:nvSpPr>
+          <p:cNvPr id="4" name="Slide Number Placeholder 3"/>
+          <p:cNvSpPr>
+            <a:spLocks noGrp="1"/>
+          </p:cNvSpPr>
+          <p:nvPr>
+            <p:ph type="sldNum" sz="quarter" idx="10"/>
+          </p:nvPr>
+        </p:nvSpPr>
+        <p:spPr/>
+        <p:txBody>
+          <a:bodyPr/>
+          <a:lstStyle/>
+          <a:p>
+            <a:fld id="{A1D1CA84-32C6-4521-9E5B-9BE0C93F27F7}" type="slidenum">
+              <a:rPr lang="en-US" smtClean="0"/>
+              <a:t>4</a:t>
+            </a:fld>
+            <a:endParaRPr lang="en-US"/>
+          </a:p>
+        </p:txBody>
+      </p:sp>
+    </p:spTree>
+    <p:extLst>
+      <p:ext uri="{BB962C8B-B14F-4D97-AF65-F5344CB8AC3E}">
+        <p14:creationId xmlns:p14="http://schemas.microsoft.com/office/powerpoint/2010/main" val="1596479708"/>
+      </p:ext>
+    </p:extLst>
+  </p:cSld>
+  <p:clrMapOvr>
+    <a:masterClrMapping/>
+  </p:clrMapOvr>
+</p:notes>
+</file>
+
+<file path=ppt/notesSlides/notesSlide5.xml><?xml version="1.0" encoding="utf-8"?>
+<p:notes xmlns:a="http://schemas.openxmlformats.org/drawingml/2006/main" xmlns:r="http://schemas.openxmlformats.org/officeDocument/2006/relationships" xmlns:p="http://schemas.openxmlformats.org/presentationml/2006/main">
+  <p:cSld>
+    <p:spTree>
+      <p:nvGrpSpPr>
+        <p:cNvPr id="1" name=""/>
+        <p:cNvGrpSpPr/>
+        <p:nvPr/>
+      </p:nvGrpSpPr>
+      <p:grpSpPr>
+        <a:xfrm>
+          <a:off x="0" y="0"/>
+          <a:ext cx="0" cy="0"/>
+          <a:chOff x="0" y="0"/>
+          <a:chExt cx="0" cy="0"/>
+        </a:xfrm>
+      </p:grpSpPr>
+      <p:sp>
+        <p:nvSpPr>
+          <p:cNvPr id="2" name="Slide Image Placeholder 1"/>
+          <p:cNvSpPr>
+            <a:spLocks noGrp="1" noRot="1" noChangeAspect="1"/>
+          </p:cNvSpPr>
+          <p:nvPr>
+            <p:ph type="sldImg"/>
+          </p:nvPr>
+        </p:nvSpPr>
+        <p:spPr/>
+      </p:sp>
+      <p:sp>
+        <p:nvSpPr>
+          <p:cNvPr id="3" name="Notes Placeholder 2"/>
+          <p:cNvSpPr>
+            <a:spLocks noGrp="1"/>
+          </p:cNvSpPr>
+          <p:nvPr>
+            <p:ph type="body" idx="1"/>
+          </p:nvPr>
+        </p:nvSpPr>
+        <p:spPr/>
+        <p:txBody>
+          <a:bodyPr/>
+          <a:lstStyle/>
+          <a:p>
+            <a:r>
+              <a:rPr lang="en-US" dirty="0" smtClean="0"/>
+              <a:t>Ross</a:t>
+            </a:r>
+            <a:endParaRPr lang="en-US" dirty="0"/>
+          </a:p>
+        </p:txBody>
+      </p:sp>
+      <p:sp>
+        <p:nvSpPr>
+          <p:cNvPr id="4" name="Slide Number Placeholder 3"/>
+          <p:cNvSpPr>
+            <a:spLocks noGrp="1"/>
+          </p:cNvSpPr>
+          <p:nvPr>
+            <p:ph type="sldNum" sz="quarter" idx="10"/>
+          </p:nvPr>
+        </p:nvSpPr>
+        <p:spPr/>
+        <p:txBody>
+          <a:bodyPr/>
+          <a:lstStyle/>
+          <a:p>
+            <a:fld id="{A1D1CA84-32C6-4521-9E5B-9BE0C93F27F7}" type="slidenum">
+              <a:rPr lang="en-US" smtClean="0"/>
+              <a:t>5</a:t>
+            </a:fld>
+            <a:endParaRPr lang="en-US"/>
+          </a:p>
+        </p:txBody>
+      </p:sp>
+    </p:spTree>
+    <p:extLst>
+      <p:ext uri="{BB962C8B-B14F-4D97-AF65-F5344CB8AC3E}">
+        <p14:creationId xmlns:p14="http://schemas.microsoft.com/office/powerpoint/2010/main" val="2801351074"/>
+      </p:ext>
+    </p:extLst>
+  </p:cSld>
+  <p:clrMapOvr>
+    <a:masterClrMapping/>
+  </p:clrMapOvr>
+</p:notes>
+</file>
+
+<file path=ppt/notesSlides/notesSlide6.xml><?xml version="1.0" encoding="utf-8"?>
+<p:notes xmlns:a="http://schemas.openxmlformats.org/drawingml/2006/main" xmlns:r="http://schemas.openxmlformats.org/officeDocument/2006/relationships" xmlns:p="http://schemas.openxmlformats.org/presentationml/2006/main">
+  <p:cSld>
+    <p:spTree>
+      <p:nvGrpSpPr>
+        <p:cNvPr id="1" name=""/>
+        <p:cNvGrpSpPr/>
+        <p:nvPr/>
+      </p:nvGrpSpPr>
+      <p:grpSpPr>
+        <a:xfrm>
+          <a:off x="0" y="0"/>
+          <a:ext cx="0" cy="0"/>
+          <a:chOff x="0" y="0"/>
+          <a:chExt cx="0" cy="0"/>
+        </a:xfrm>
+      </p:grpSpPr>
+      <p:sp>
+        <p:nvSpPr>
+          <p:cNvPr id="2" name="Slide Image Placeholder 1"/>
+          <p:cNvSpPr>
+            <a:spLocks noGrp="1" noRot="1" noChangeAspect="1"/>
+          </p:cNvSpPr>
+          <p:nvPr>
+            <p:ph type="sldImg"/>
+          </p:nvPr>
+        </p:nvSpPr>
+        <p:spPr/>
+      </p:sp>
+      <p:sp>
+        <p:nvSpPr>
+          <p:cNvPr id="3" name="Notes Placeholder 2"/>
+          <p:cNvSpPr>
+            <a:spLocks noGrp="1"/>
+          </p:cNvSpPr>
+          <p:nvPr>
+            <p:ph type="body" idx="1"/>
+          </p:nvPr>
+        </p:nvSpPr>
+        <p:spPr/>
+        <p:txBody>
+          <a:bodyPr/>
+          <a:lstStyle/>
+          <a:p>
+            <a:pPr marL="0" marR="0" indent="0" algn="l" defTabSz="914400" rtl="0" eaLnBrk="1" fontAlgn="auto" latinLnBrk="0" hangingPunct="1">
+              <a:lnSpc>
+                <a:spcPct val="100000"/>
+              </a:lnSpc>
+              <a:spcBef>
+                <a:spcPts val="0"/>
+              </a:spcBef>
+              <a:spcAft>
+                <a:spcPts val="0"/>
+              </a:spcAft>
+              <a:buClrTx/>
+              <a:buSzTx/>
+              <a:buFontTx/>
+              <a:buNone/>
+              <a:tabLst/>
+              <a:defRPr/>
+            </a:pPr>
+            <a:r>
+              <a:rPr lang="en-US" dirty="0" smtClean="0"/>
+              <a:t>Ben</a:t>
+            </a:r>
+          </a:p>
+          <a:p>
+            <a:endParaRPr lang="en-US" dirty="0"/>
+          </a:p>
+        </p:txBody>
+      </p:sp>
+      <p:sp>
+        <p:nvSpPr>
+          <p:cNvPr id="4" name="Slide Number Placeholder 3"/>
+          <p:cNvSpPr>
+            <a:spLocks noGrp="1"/>
+          </p:cNvSpPr>
+          <p:nvPr>
+            <p:ph type="sldNum" sz="quarter" idx="10"/>
+          </p:nvPr>
+        </p:nvSpPr>
+        <p:spPr/>
+        <p:txBody>
+          <a:bodyPr/>
+          <a:lstStyle/>
+          <a:p>
+            <a:fld id="{A1D1CA84-32C6-4521-9E5B-9BE0C93F27F7}" type="slidenum">
+              <a:rPr lang="en-US" smtClean="0"/>
+              <a:t>6</a:t>
+            </a:fld>
+            <a:endParaRPr lang="en-US"/>
+          </a:p>
+        </p:txBody>
+      </p:sp>
+    </p:spTree>
+    <p:extLst>
+      <p:ext uri="{BB962C8B-B14F-4D97-AF65-F5344CB8AC3E}">
+        <p14:creationId xmlns:p14="http://schemas.microsoft.com/office/powerpoint/2010/main" val="3357686095"/>
+      </p:ext>
+    </p:extLst>
+  </p:cSld>
+  <p:clrMapOvr>
+    <a:masterClrMapping/>
+  </p:clrMapOvr>
+</p:notes>
+</file>
+
+<file path=ppt/notesSlides/notesSlide7.xml><?xml version="1.0" encoding="utf-8"?>
+<p:notes xmlns:a="http://schemas.openxmlformats.org/drawingml/2006/main" xmlns:r="http://schemas.openxmlformats.org/officeDocument/2006/relationships" xmlns:p="http://schemas.openxmlformats.org/presentationml/2006/main">
+  <p:cSld>
+    <p:spTree>
+      <p:nvGrpSpPr>
+        <p:cNvPr id="1" name=""/>
+        <p:cNvGrpSpPr/>
+        <p:nvPr/>
+      </p:nvGrpSpPr>
+      <p:grpSpPr>
+        <a:xfrm>
+          <a:off x="0" y="0"/>
+          <a:ext cx="0" cy="0"/>
+          <a:chOff x="0" y="0"/>
+          <a:chExt cx="0" cy="0"/>
+        </a:xfrm>
+      </p:grpSpPr>
+      <p:sp>
+        <p:nvSpPr>
+          <p:cNvPr id="2" name="Slide Image Placeholder 1"/>
+          <p:cNvSpPr>
+            <a:spLocks noGrp="1" noRot="1" noChangeAspect="1"/>
+          </p:cNvSpPr>
+          <p:nvPr>
+            <p:ph type="sldImg"/>
+          </p:nvPr>
+        </p:nvSpPr>
+        <p:spPr/>
+      </p:sp>
+      <p:sp>
+        <p:nvSpPr>
+          <p:cNvPr id="3" name="Notes Placeholder 2"/>
+          <p:cNvSpPr>
+            <a:spLocks noGrp="1"/>
+          </p:cNvSpPr>
+          <p:nvPr>
+            <p:ph type="body" idx="1"/>
+          </p:nvPr>
+        </p:nvSpPr>
+        <p:spPr/>
+        <p:txBody>
+          <a:bodyPr/>
+          <a:lstStyle/>
+          <a:p>
+            <a:r>
+              <a:rPr lang="en-US" dirty="0" smtClean="0"/>
+              <a:t>Ross</a:t>
+            </a:r>
+            <a:endParaRPr lang="en-US" dirty="0"/>
+          </a:p>
+        </p:txBody>
+      </p:sp>
+      <p:sp>
+        <p:nvSpPr>
+          <p:cNvPr id="4" name="Slide Number Placeholder 3"/>
+          <p:cNvSpPr>
+            <a:spLocks noGrp="1"/>
+          </p:cNvSpPr>
+          <p:nvPr>
+            <p:ph type="sldNum" sz="quarter" idx="10"/>
+          </p:nvPr>
+        </p:nvSpPr>
+        <p:spPr/>
+        <p:txBody>
+          <a:bodyPr/>
+          <a:lstStyle/>
+          <a:p>
+            <a:fld id="{A1D1CA84-32C6-4521-9E5B-9BE0C93F27F7}" type="slidenum">
+              <a:rPr lang="en-US" smtClean="0"/>
+              <a:t>7</a:t>
+            </a:fld>
+            <a:endParaRPr lang="en-US"/>
+          </a:p>
+        </p:txBody>
+      </p:sp>
+    </p:spTree>
+    <p:extLst>
+      <p:ext uri="{BB962C8B-B14F-4D97-AF65-F5344CB8AC3E}">
+        <p14:creationId xmlns:p14="http://schemas.microsoft.com/office/powerpoint/2010/main" val="1220566165"/>
+      </p:ext>
+    </p:extLst>
+  </p:cSld>
+  <p:clrMapOvr>
+    <a:masterClrMapping/>
+  </p:clrMapOvr>
+</p:notes>
+</file>
+
+<file path=ppt/notesSlides/notesSlide8.xml><?xml version="1.0" encoding="utf-8"?>
+<p:notes xmlns:a="http://schemas.openxmlformats.org/drawingml/2006/main" xmlns:r="http://schemas.openxmlformats.org/officeDocument/2006/relationships" xmlns:p="http://schemas.openxmlformats.org/presentationml/2006/main">
+  <p:cSld>
+    <p:spTree>
+      <p:nvGrpSpPr>
+        <p:cNvPr id="1" name=""/>
+        <p:cNvGrpSpPr/>
+        <p:nvPr/>
+      </p:nvGrpSpPr>
+      <p:grpSpPr>
+        <a:xfrm>
+          <a:off x="0" y="0"/>
+          <a:ext cx="0" cy="0"/>
+          <a:chOff x="0" y="0"/>
+          <a:chExt cx="0" cy="0"/>
+        </a:xfrm>
+      </p:grpSpPr>
+      <p:sp>
+        <p:nvSpPr>
+          <p:cNvPr id="2" name="Slide Image Placeholder 1"/>
+          <p:cNvSpPr>
+            <a:spLocks noGrp="1" noRot="1" noChangeAspect="1"/>
+          </p:cNvSpPr>
+          <p:nvPr>
+            <p:ph type="sldImg"/>
+          </p:nvPr>
+        </p:nvSpPr>
+        <p:spPr/>
+      </p:sp>
+      <p:sp>
+        <p:nvSpPr>
+          <p:cNvPr id="3" name="Notes Placeholder 2"/>
+          <p:cNvSpPr>
+            <a:spLocks noGrp="1"/>
+          </p:cNvSpPr>
+          <p:nvPr>
+            <p:ph type="body" idx="1"/>
+          </p:nvPr>
+        </p:nvSpPr>
+        <p:spPr/>
+        <p:txBody>
+          <a:bodyPr/>
+          <a:lstStyle/>
+          <a:p>
+            <a:pPr marL="0" marR="0" indent="0" algn="l" defTabSz="914400" rtl="0" eaLnBrk="1" fontAlgn="auto" latinLnBrk="0" hangingPunct="1">
+              <a:lnSpc>
+                <a:spcPct val="100000"/>
+              </a:lnSpc>
+              <a:spcBef>
+                <a:spcPts val="0"/>
+              </a:spcBef>
+              <a:spcAft>
+                <a:spcPts val="0"/>
+              </a:spcAft>
+              <a:buClrTx/>
+              <a:buSzTx/>
+              <a:buFontTx/>
+              <a:buNone/>
+              <a:tabLst/>
+              <a:defRPr/>
+            </a:pPr>
+            <a:r>
+              <a:rPr lang="en-US" dirty="0" smtClean="0"/>
+              <a:t>Ben</a:t>
+            </a:r>
+          </a:p>
+          <a:p>
+            <a:endParaRPr lang="en-US" dirty="0"/>
+          </a:p>
+        </p:txBody>
+      </p:sp>
+      <p:sp>
+        <p:nvSpPr>
+          <p:cNvPr id="4" name="Slide Number Placeholder 3"/>
+          <p:cNvSpPr>
+            <a:spLocks noGrp="1"/>
+          </p:cNvSpPr>
+          <p:nvPr>
+            <p:ph type="sldNum" sz="quarter" idx="10"/>
+          </p:nvPr>
+        </p:nvSpPr>
+        <p:spPr/>
+        <p:txBody>
+          <a:bodyPr/>
+          <a:lstStyle/>
+          <a:p>
+            <a:fld id="{A1D1CA84-32C6-4521-9E5B-9BE0C93F27F7}" type="slidenum">
+              <a:rPr lang="en-US" smtClean="0"/>
+              <a:t>8</a:t>
+            </a:fld>
+            <a:endParaRPr lang="en-US"/>
+          </a:p>
+        </p:txBody>
+      </p:sp>
+    </p:spTree>
+    <p:extLst>
+      <p:ext uri="{BB962C8B-B14F-4D97-AF65-F5344CB8AC3E}">
+        <p14:creationId xmlns:p14="http://schemas.microsoft.com/office/powerpoint/2010/main" val="3497170813"/>
+      </p:ext>
+    </p:extLst>
+  </p:cSld>
+  <p:clrMapOvr>
+    <a:masterClrMapping/>
+  </p:clrMapOvr>
+</p:notes>
+</file>
+
+<file path=ppt/notesSlides/notesSlide9.xml><?xml version="1.0" encoding="utf-8"?>
+<p:notes xmlns:a="http://schemas.openxmlformats.org/drawingml/2006/main" xmlns:r="http://schemas.openxmlformats.org/officeDocument/2006/relationships" xmlns:p="http://schemas.openxmlformats.org/presentationml/2006/main">
+  <p:cSld>
+    <p:spTree>
+      <p:nvGrpSpPr>
+        <p:cNvPr id="1" name=""/>
+        <p:cNvGrpSpPr/>
+        <p:nvPr/>
+      </p:nvGrpSpPr>
+      <p:grpSpPr>
+        <a:xfrm>
+          <a:off x="0" y="0"/>
+          <a:ext cx="0" cy="0"/>
+          <a:chOff x="0" y="0"/>
+          <a:chExt cx="0" cy="0"/>
+        </a:xfrm>
+      </p:grpSpPr>
+      <p:sp>
+        <p:nvSpPr>
+          <p:cNvPr id="2" name="Slide Image Placeholder 1"/>
+          <p:cNvSpPr>
+            <a:spLocks noGrp="1" noRot="1" noChangeAspect="1"/>
+          </p:cNvSpPr>
+          <p:nvPr>
+            <p:ph type="sldImg"/>
+          </p:nvPr>
+        </p:nvSpPr>
+        <p:spPr/>
+      </p:sp>
+      <p:sp>
+        <p:nvSpPr>
+          <p:cNvPr id="3" name="Notes Placeholder 2"/>
+          <p:cNvSpPr>
+            <a:spLocks noGrp="1"/>
+          </p:cNvSpPr>
+          <p:nvPr>
+            <p:ph type="body" idx="1"/>
+          </p:nvPr>
+        </p:nvSpPr>
+        <p:spPr/>
+        <p:txBody>
+          <a:bodyPr/>
+          <a:lstStyle/>
+          <a:p>
+            <a:r>
+              <a:rPr lang="en-US" dirty="0" smtClean="0"/>
+              <a:t>Ross</a:t>
+            </a:r>
+            <a:endParaRPr lang="en-US" dirty="0"/>
+          </a:p>
+        </p:txBody>
+      </p:sp>
+      <p:sp>
+        <p:nvSpPr>
+          <p:cNvPr id="4" name="Slide Number Placeholder 3"/>
+          <p:cNvSpPr>
+            <a:spLocks noGrp="1"/>
+          </p:cNvSpPr>
+          <p:nvPr>
+            <p:ph type="sldNum" sz="quarter" idx="10"/>
+          </p:nvPr>
+        </p:nvSpPr>
+        <p:spPr/>
+        <p:txBody>
+          <a:bodyPr/>
+          <a:lstStyle/>
+          <a:p>
+            <a:fld id="{A1D1CA84-32C6-4521-9E5B-9BE0C93F27F7}" type="slidenum">
+              <a:rPr lang="en-US" smtClean="0"/>
+              <a:t>9</a:t>
+            </a:fld>
+            <a:endParaRPr lang="en-US"/>
+          </a:p>
+        </p:txBody>
+      </p:sp>
+    </p:spTree>
+    <p:extLst>
+      <p:ext uri="{BB962C8B-B14F-4D97-AF65-F5344CB8AC3E}">
+        <p14:creationId xmlns:p14="http://schemas.microsoft.com/office/powerpoint/2010/main" val="1088000785"/>
+      </p:ext>
+    </p:extLst>
+  </p:cSld>
+  <p:clrMapOvr>
+    <a:masterClrMapping/>
+  </p:clrMapOvr>
+</p:notes>
+</file>
+
 <file path=ppt/slideLayouts/slideLayout1.xml><?xml version="1.0" encoding="utf-8"?>
 <p:sldLayout xmlns:a="http://schemas.openxmlformats.org/drawingml/2006/main" xmlns:r="http://schemas.openxmlformats.org/officeDocument/2006/relationships" xmlns:p="http://schemas.openxmlformats.org/presentationml/2006/main" type="title" preserve="1">
   <p:cSld name="Title Slide">
@@ -310,7 +1764,7 @@
             <a:fld id="{1D8BD707-D9CF-40AE-B4C6-C98DA3205C09}" type="datetimeFigureOut">
               <a:rPr lang="en-US" smtClean="0"/>
               <a:pPr/>
-              <a:t>5/16/2013</a:t>
+              <a:t>5/17/2013</a:t>
             </a:fld>
             <a:endParaRPr lang="en-US"/>
           </a:p>
@@ -477,7 +1931,7 @@
             <a:fld id="{1D8BD707-D9CF-40AE-B4C6-C98DA3205C09}" type="datetimeFigureOut">
               <a:rPr lang="en-US" smtClean="0"/>
               <a:pPr/>
-              <a:t>5/16/2013</a:t>
+              <a:t>5/17/2013</a:t>
             </a:fld>
             <a:endParaRPr lang="en-US"/>
           </a:p>
@@ -654,7 +2108,7 @@
             <a:fld id="{1D8BD707-D9CF-40AE-B4C6-C98DA3205C09}" type="datetimeFigureOut">
               <a:rPr lang="en-US" smtClean="0"/>
               <a:pPr/>
-              <a:t>5/16/2013</a:t>
+              <a:t>5/17/2013</a:t>
             </a:fld>
             <a:endParaRPr lang="en-US"/>
           </a:p>
@@ -839,7 +2293,7 @@
             <a:fld id="{1D8BD707-D9CF-40AE-B4C6-C98DA3205C09}" type="datetimeFigureOut">
               <a:rPr lang="en-US" smtClean="0"/>
               <a:pPr/>
-              <a:t>5/16/2013</a:t>
+              <a:t>5/17/2013</a:t>
             </a:fld>
             <a:endParaRPr lang="en-US"/>
           </a:p>
@@ -1103,7 +2557,7 @@
             <a:fld id="{1D8BD707-D9CF-40AE-B4C6-C98DA3205C09}" type="datetimeFigureOut">
               <a:rPr lang="en-US" smtClean="0"/>
               <a:pPr/>
-              <a:t>5/16/2013</a:t>
+              <a:t>5/17/2013</a:t>
             </a:fld>
             <a:endParaRPr lang="en-US"/>
           </a:p>
@@ -1453,7 +2907,7 @@
             <a:fld id="{1D8BD707-D9CF-40AE-B4C6-C98DA3205C09}" type="datetimeFigureOut">
               <a:rPr lang="en-US" smtClean="0"/>
               <a:pPr/>
-              <a:t>5/16/2013</a:t>
+              <a:t>5/17/2013</a:t>
             </a:fld>
             <a:endParaRPr lang="en-US"/>
           </a:p>
@@ -1763,7 +3217,7 @@
             <a:fld id="{1D8BD707-D9CF-40AE-B4C6-C98DA3205C09}" type="datetimeFigureOut">
               <a:rPr lang="en-US" smtClean="0"/>
               <a:pPr/>
-              <a:t>5/16/2013</a:t>
+              <a:t>5/17/2013</a:t>
             </a:fld>
             <a:endParaRPr lang="en-US"/>
           </a:p>
@@ -1992,7 +3446,7 @@
             <a:fld id="{1D8BD707-D9CF-40AE-B4C6-C98DA3205C09}" type="datetimeFigureOut">
               <a:rPr lang="en-US" smtClean="0"/>
               <a:pPr/>
-              <a:t>5/16/2013</a:t>
+              <a:t>5/17/2013</a:t>
             </a:fld>
             <a:endParaRPr lang="en-US"/>
           </a:p>
@@ -2084,7 +3538,7 @@
             <a:fld id="{1D8BD707-D9CF-40AE-B4C6-C98DA3205C09}" type="datetimeFigureOut">
               <a:rPr lang="en-US" smtClean="0"/>
               <a:pPr/>
-              <a:t>5/16/2013</a:t>
+              <a:t>5/17/2013</a:t>
             </a:fld>
             <a:endParaRPr lang="en-US"/>
           </a:p>
@@ -2374,7 +3828,7 @@
             <a:fld id="{1D8BD707-D9CF-40AE-B4C6-C98DA3205C09}" type="datetimeFigureOut">
               <a:rPr lang="en-US" smtClean="0"/>
               <a:pPr/>
-              <a:t>5/16/2013</a:t>
+              <a:t>5/17/2013</a:t>
             </a:fld>
             <a:endParaRPr lang="en-US"/>
           </a:p>
@@ -2645,7 +4099,7 @@
             <a:fld id="{1D8BD707-D9CF-40AE-B4C6-C98DA3205C09}" type="datetimeFigureOut">
               <a:rPr lang="en-US" smtClean="0"/>
               <a:pPr/>
-              <a:t>5/16/2013</a:t>
+              <a:t>5/17/2013</a:t>
             </a:fld>
             <a:endParaRPr lang="en-US"/>
           </a:p>
@@ -2857,7 +4311,7 @@
             <a:fld id="{1D8BD707-D9CF-40AE-B4C6-C98DA3205C09}" type="datetimeFigureOut">
               <a:rPr lang="en-US" smtClean="0"/>
               <a:pPr/>
-              <a:t>5/16/2013</a:t>
+              <a:t>5/17/2013</a:t>
             </a:fld>
             <a:endParaRPr lang="en-US"/>
           </a:p>
@@ -3868,7 +5322,7 @@
           </p:nvPr>
         </p:nvPicPr>
         <p:blipFill>
-          <a:blip r:embed="rId2"/>
+          <a:blip r:embed="rId3"/>
           <a:stretch>
             <a:fillRect/>
           </a:stretch>
@@ -3947,7 +5401,7 @@
           </p:nvPr>
         </p:nvPicPr>
         <p:blipFill>
-          <a:blip r:embed="rId2"/>
+          <a:blip r:embed="rId3"/>
           <a:stretch>
             <a:fillRect/>
           </a:stretch>
@@ -4026,7 +5480,7 @@
           </p:nvPr>
         </p:nvPicPr>
         <p:blipFill>
-          <a:blip r:embed="rId2"/>
+          <a:blip r:embed="rId3"/>
           <a:stretch>
             <a:fillRect/>
           </a:stretch>
@@ -4105,7 +5559,7 @@
           </p:nvPr>
         </p:nvPicPr>
         <p:blipFill>
-          <a:blip r:embed="rId2">
+          <a:blip r:embed="rId3">
             <a:extLst>
               <a:ext uri="{28A0092B-C50C-407E-A947-70E740481C1C}">
                 <a14:useLocalDpi xmlns:a14="http://schemas.microsoft.com/office/drawing/2010/main" val="0"/>
@@ -4188,7 +5642,7 @@
           </p:nvPr>
         </p:nvPicPr>
         <p:blipFill>
-          <a:blip r:embed="rId2">
+          <a:blip r:embed="rId3">
             <a:extLst>
               <a:ext uri="{28A0092B-C50C-407E-A947-70E740481C1C}">
                 <a14:useLocalDpi xmlns:a14="http://schemas.microsoft.com/office/drawing/2010/main" val="0"/>
@@ -4419,7 +5873,7 @@
           <p:nvPr/>
         </p:nvPicPr>
         <p:blipFill>
-          <a:blip r:embed="rId2" cstate="print">
+          <a:blip r:embed="rId3" cstate="print">
             <a:extLst>
               <a:ext uri="{28A0092B-C50C-407E-A947-70E740481C1C}">
                 <a14:useLocalDpi xmlns:a14="http://schemas.microsoft.com/office/drawing/2010/main" val="0"/>
@@ -4742,4 +6196,289 @@
   <a:objectDefaults/>
   <a:extraClrSchemeLst/>
 </a:theme>
+</file>
+
+<file path=ppt/theme/theme2.xml><?xml version="1.0" encoding="utf-8"?>
+<a:theme xmlns:a="http://schemas.openxmlformats.org/drawingml/2006/main" name="Office Theme">
+  <a:themeElements>
+    <a:clrScheme name="Office">
+      <a:dk1>
+        <a:sysClr val="windowText" lastClr="000000"/>
+      </a:dk1>
+      <a:lt1>
+        <a:sysClr val="window" lastClr="FFFFFF"/>
+      </a:lt1>
+      <a:dk2>
+        <a:srgbClr val="1F497D"/>
+      </a:dk2>
+      <a:lt2>
+        <a:srgbClr val="EEECE1"/>
+      </a:lt2>
+      <a:accent1>
+        <a:srgbClr val="4F81BD"/>
+      </a:accent1>
+      <a:accent2>
+        <a:srgbClr val="C0504D"/>
+      </a:accent2>
+      <a:accent3>
+        <a:srgbClr val="9BBB59"/>
+      </a:accent3>
+      <a:accent4>
+        <a:srgbClr val="8064A2"/>
+      </a:accent4>
+      <a:accent5>
+        <a:srgbClr val="4BACC6"/>
+      </a:accent5>
+      <a:accent6>
+        <a:srgbClr val="F79646"/>
+      </a:accent6>
+      <a:hlink>
+        <a:srgbClr val="0000FF"/>
+      </a:hlink>
+      <a:folHlink>
+        <a:srgbClr val="800080"/>
+      </a:folHlink>
+    </a:clrScheme>
+    <a:fontScheme name="Office">
+      <a:majorFont>
+        <a:latin typeface="Calibri"/>
+        <a:ea typeface=""/>
+        <a:cs typeface=""/>
+        <a:font script="Jpan" typeface="ＭＳ Ｐゴシック"/>
+        <a:font script="Hang" typeface="맑은 고딕"/>
+        <a:font script="Hans" typeface="宋体"/>
+        <a:font script="Hant" typeface="新細明體"/>
+        <a:font script="Arab" typeface="Times New Roman"/>
+        <a:font script="Hebr" typeface="Times New Roman"/>
+        <a:font script="Thai" typeface="Angsana New"/>
+        <a:font script="Ethi" typeface="Nyala"/>
+        <a:font script="Beng" typeface="Vrinda"/>
+        <a:font script="Gujr" typeface="Shruti"/>
+        <a:font script="Khmr" typeface="MoolBoran"/>
+        <a:font script="Knda" typeface="Tunga"/>
+        <a:font script="Guru" typeface="Raavi"/>
+        <a:font script="Cans" typeface="Euphemia"/>
+        <a:font script="Cher" typeface="Plantagenet Cherokee"/>
+        <a:font script="Yiii" typeface="Microsoft Yi Baiti"/>
+        <a:font script="Tibt" typeface="Microsoft Himalaya"/>
+        <a:font script="Thaa" typeface="MV Boli"/>
+        <a:font script="Deva" typeface="Mangal"/>
+        <a:font script="Telu" typeface="Gautami"/>
+        <a:font script="Taml" typeface="Latha"/>
+        <a:font script="Syrc" typeface="Estrangelo Edessa"/>
+        <a:font script="Orya" typeface="Kalinga"/>
+        <a:font script="Mlym" typeface="Kartika"/>
+        <a:font script="Laoo" typeface="DokChampa"/>
+        <a:font script="Sinh" typeface="Iskoola Pota"/>
+        <a:font script="Mong" typeface="Mongolian Baiti"/>
+        <a:font script="Viet" typeface="Times New Roman"/>
+        <a:font script="Uigh" typeface="Microsoft Uighur"/>
+        <a:font script="Geor" typeface="Sylfaen"/>
+      </a:majorFont>
+      <a:minorFont>
+        <a:latin typeface="Calibri"/>
+        <a:ea typeface=""/>
+        <a:cs typeface=""/>
+        <a:font script="Jpan" typeface="ＭＳ Ｐゴシック"/>
+        <a:font script="Hang" typeface="맑은 고딕"/>
+        <a:font script="Hans" typeface="宋体"/>
+        <a:font script="Hant" typeface="新細明體"/>
+        <a:font script="Arab" typeface="Arial"/>
+        <a:font script="Hebr" typeface="Arial"/>
+        <a:font script="Thai" typeface="Cordia New"/>
+        <a:font script="Ethi" typeface="Nyala"/>
+        <a:font script="Beng" typeface="Vrinda"/>
+        <a:font script="Gujr" typeface="Shruti"/>
+        <a:font script="Khmr" typeface="DaunPenh"/>
+        <a:font script="Knda" typeface="Tunga"/>
+        <a:font script="Guru" typeface="Raavi"/>
+        <a:font script="Cans" typeface="Euphemia"/>
+        <a:font script="Cher" typeface="Plantagenet Cherokee"/>
+        <a:font script="Yiii" typeface="Microsoft Yi Baiti"/>
+        <a:font script="Tibt" typeface="Microsoft Himalaya"/>
+        <a:font script="Thaa" typeface="MV Boli"/>
+        <a:font script="Deva" typeface="Mangal"/>
+        <a:font script="Telu" typeface="Gautami"/>
+        <a:font script="Taml" typeface="Latha"/>
+        <a:font script="Syrc" typeface="Estrangelo Edessa"/>
+        <a:font script="Orya" typeface="Kalinga"/>
+        <a:font script="Mlym" typeface="Kartika"/>
+        <a:font script="Laoo" typeface="DokChampa"/>
+        <a:font script="Sinh" typeface="Iskoola Pota"/>
+        <a:font script="Mong" typeface="Mongolian Baiti"/>
+        <a:font script="Viet" typeface="Arial"/>
+        <a:font script="Uigh" typeface="Microsoft Uighur"/>
+        <a:font script="Geor" typeface="Sylfaen"/>
+      </a:minorFont>
+    </a:fontScheme>
+    <a:fmtScheme name="Office">
+      <a:fillStyleLst>
+        <a:solidFill>
+          <a:schemeClr val="phClr"/>
+        </a:solidFill>
+        <a:gradFill rotWithShape="1">
+          <a:gsLst>
+            <a:gs pos="0">
+              <a:schemeClr val="phClr">
+                <a:tint val="50000"/>
+                <a:satMod val="300000"/>
+              </a:schemeClr>
+            </a:gs>
+            <a:gs pos="35000">
+              <a:schemeClr val="phClr">
+                <a:tint val="37000"/>
+                <a:satMod val="300000"/>
+              </a:schemeClr>
+            </a:gs>
+            <a:gs pos="100000">
+              <a:schemeClr val="phClr">
+                <a:tint val="15000"/>
+                <a:satMod val="350000"/>
+              </a:schemeClr>
+            </a:gs>
+          </a:gsLst>
+          <a:lin ang="16200000" scaled="1"/>
+        </a:gradFill>
+        <a:gradFill rotWithShape="1">
+          <a:gsLst>
+            <a:gs pos="0">
+              <a:schemeClr val="phClr">
+                <a:shade val="51000"/>
+                <a:satMod val="130000"/>
+              </a:schemeClr>
+            </a:gs>
+            <a:gs pos="80000">
+              <a:schemeClr val="phClr">
+                <a:shade val="93000"/>
+                <a:satMod val="130000"/>
+              </a:schemeClr>
+            </a:gs>
+            <a:gs pos="100000">
+              <a:schemeClr val="phClr">
+                <a:shade val="94000"/>
+                <a:satMod val="135000"/>
+              </a:schemeClr>
+            </a:gs>
+          </a:gsLst>
+          <a:lin ang="16200000" scaled="0"/>
+        </a:gradFill>
+      </a:fillStyleLst>
+      <a:lnStyleLst>
+        <a:ln w="9525" cap="flat" cmpd="sng" algn="ctr">
+          <a:solidFill>
+            <a:schemeClr val="phClr">
+              <a:shade val="95000"/>
+              <a:satMod val="105000"/>
+            </a:schemeClr>
+          </a:solidFill>
+          <a:prstDash val="solid"/>
+        </a:ln>
+        <a:ln w="25400" cap="flat" cmpd="sng" algn="ctr">
+          <a:solidFill>
+            <a:schemeClr val="phClr"/>
+          </a:solidFill>
+          <a:prstDash val="solid"/>
+        </a:ln>
+        <a:ln w="38100" cap="flat" cmpd="sng" algn="ctr">
+          <a:solidFill>
+            <a:schemeClr val="phClr"/>
+          </a:solidFill>
+          <a:prstDash val="solid"/>
+        </a:ln>
+      </a:lnStyleLst>
+      <a:effectStyleLst>
+        <a:effectStyle>
+          <a:effectLst>
+            <a:outerShdw blurRad="40000" dist="20000" dir="5400000" rotWithShape="0">
+              <a:srgbClr val="000000">
+                <a:alpha val="38000"/>
+              </a:srgbClr>
+            </a:outerShdw>
+          </a:effectLst>
+        </a:effectStyle>
+        <a:effectStyle>
+          <a:effectLst>
+            <a:outerShdw blurRad="40000" dist="23000" dir="5400000" rotWithShape="0">
+              <a:srgbClr val="000000">
+                <a:alpha val="35000"/>
+              </a:srgbClr>
+            </a:outerShdw>
+          </a:effectLst>
+        </a:effectStyle>
+        <a:effectStyle>
+          <a:effectLst>
+            <a:outerShdw blurRad="40000" dist="23000" dir="5400000" rotWithShape="0">
+              <a:srgbClr val="000000">
+                <a:alpha val="35000"/>
+              </a:srgbClr>
+            </a:outerShdw>
+          </a:effectLst>
+          <a:scene3d>
+            <a:camera prst="orthographicFront">
+              <a:rot lat="0" lon="0" rev="0"/>
+            </a:camera>
+            <a:lightRig rig="threePt" dir="t">
+              <a:rot lat="0" lon="0" rev="1200000"/>
+            </a:lightRig>
+          </a:scene3d>
+          <a:sp3d>
+            <a:bevelT w="63500" h="25400"/>
+          </a:sp3d>
+        </a:effectStyle>
+      </a:effectStyleLst>
+      <a:bgFillStyleLst>
+        <a:solidFill>
+          <a:schemeClr val="phClr"/>
+        </a:solidFill>
+        <a:gradFill rotWithShape="1">
+          <a:gsLst>
+            <a:gs pos="0">
+              <a:schemeClr val="phClr">
+                <a:tint val="40000"/>
+                <a:satMod val="350000"/>
+              </a:schemeClr>
+            </a:gs>
+            <a:gs pos="40000">
+              <a:schemeClr val="phClr">
+                <a:tint val="45000"/>
+                <a:shade val="99000"/>
+                <a:satMod val="350000"/>
+              </a:schemeClr>
+            </a:gs>
+            <a:gs pos="100000">
+              <a:schemeClr val="phClr">
+                <a:shade val="20000"/>
+                <a:satMod val="255000"/>
+              </a:schemeClr>
+            </a:gs>
+          </a:gsLst>
+          <a:path path="circle">
+            <a:fillToRect l="50000" t="-80000" r="50000" b="180000"/>
+          </a:path>
+        </a:gradFill>
+        <a:gradFill rotWithShape="1">
+          <a:gsLst>
+            <a:gs pos="0">
+              <a:schemeClr val="phClr">
+                <a:tint val="80000"/>
+                <a:satMod val="300000"/>
+              </a:schemeClr>
+            </a:gs>
+            <a:gs pos="100000">
+              <a:schemeClr val="phClr">
+                <a:shade val="30000"/>
+                <a:satMod val="200000"/>
+              </a:schemeClr>
+            </a:gs>
+          </a:gsLst>
+          <a:path path="circle">
+            <a:fillToRect l="50000" t="50000" r="50000" b="50000"/>
+          </a:path>
+        </a:gradFill>
+      </a:bgFillStyleLst>
+    </a:fmtScheme>
+  </a:themeElements>
+  <a:objectDefaults/>
+  <a:extraClrSchemeLst/>
+</a:theme>
 </file>
</xml_diff>

<commit_message>
Add notes to presentation
</commit_message>
<xml_diff>
--- a/Documents/Presentation.pptx
+++ b/Documents/Presentation.pptx
@@ -5,7 +5,7 @@
     <p:sldMasterId id="2147483708" r:id="rId1"/>
   </p:sldMasterIdLst>
   <p:notesMasterIdLst>
-    <p:notesMasterId r:id="rId13"/>
+    <p:notesMasterId r:id="rId14"/>
   </p:notesMasterIdLst>
   <p:sldIdLst>
     <p:sldId id="256" r:id="rId2"/>
@@ -19,6 +19,7 @@
     <p:sldId id="261" r:id="rId10"/>
     <p:sldId id="264" r:id="rId11"/>
     <p:sldId id="266" r:id="rId12"/>
+    <p:sldId id="268" r:id="rId13"/>
   </p:sldIdLst>
   <p:sldSz cx="9144000" cy="6858000" type="screen4x3"/>
   <p:notesSz cx="6858000" cy="9144000"/>
@@ -727,12 +728,12 @@
               <a:defRPr/>
             </a:pPr>
             <a:r>
-              <a:rPr lang="en-US" smtClean="0"/>
+              <a:rPr lang="en-US" dirty="0" smtClean="0"/>
               <a:t>Ben</a:t>
             </a:r>
           </a:p>
           <a:p>
-            <a:endParaRPr lang="en-US"/>
+            <a:endParaRPr lang="en-US" dirty="0"/>
           </a:p>
         </p:txBody>
       </p:sp>
@@ -5131,6 +5132,100 @@
     <p:extLst>
       <p:ext uri="{BB962C8B-B14F-4D97-AF65-F5344CB8AC3E}">
         <p14:creationId xmlns:p14="http://schemas.microsoft.com/office/powerpoint/2010/main" val="298950444"/>
+      </p:ext>
+    </p:extLst>
+  </p:cSld>
+  <p:clrMapOvr>
+    <a:masterClrMapping/>
+  </p:clrMapOvr>
+</p:sld>
+</file>
+
+<file path=ppt/slides/slide12.xml><?xml version="1.0" encoding="utf-8"?>
+<p:sld xmlns:a="http://schemas.openxmlformats.org/drawingml/2006/main" xmlns:r="http://schemas.openxmlformats.org/officeDocument/2006/relationships" xmlns:p="http://schemas.openxmlformats.org/presentationml/2006/main">
+  <p:cSld>
+    <p:spTree>
+      <p:nvGrpSpPr>
+        <p:cNvPr id="1" name=""/>
+        <p:cNvGrpSpPr/>
+        <p:nvPr/>
+      </p:nvGrpSpPr>
+      <p:grpSpPr>
+        <a:xfrm>
+          <a:off x="0" y="0"/>
+          <a:ext cx="0" cy="0"/>
+          <a:chOff x="0" y="0"/>
+          <a:chExt cx="0" cy="0"/>
+        </a:xfrm>
+      </p:grpSpPr>
+      <p:sp>
+        <p:nvSpPr>
+          <p:cNvPr id="2" name="Title 1"/>
+          <p:cNvSpPr>
+            <a:spLocks noGrp="1"/>
+          </p:cNvSpPr>
+          <p:nvPr>
+            <p:ph type="title"/>
+          </p:nvPr>
+        </p:nvSpPr>
+        <p:spPr/>
+        <p:txBody>
+          <a:bodyPr/>
+          <a:lstStyle/>
+          <a:p>
+            <a:r>
+              <a:rPr lang="en-US" dirty="0" smtClean="0"/>
+              <a:t>Questions</a:t>
+            </a:r>
+            <a:endParaRPr lang="en-US" dirty="0"/>
+          </a:p>
+        </p:txBody>
+      </p:sp>
+      <p:pic>
+        <p:nvPicPr>
+          <p:cNvPr id="1027" name="Picture 3" descr="C:\Users\bpasse.ZIROUS\AppData\Local\Microsoft\Windows\Temporary Internet Files\Content.IE5\6SL6I7GN\MC900431512[1].png"/>
+          <p:cNvPicPr>
+            <a:picLocks noChangeAspect="1" noChangeArrowheads="1"/>
+          </p:cNvPicPr>
+          <p:nvPr/>
+        </p:nvPicPr>
+        <p:blipFill>
+          <a:blip r:embed="rId2">
+            <a:extLst>
+              <a:ext uri="{28A0092B-C50C-407E-A947-70E740481C1C}">
+                <a14:useLocalDpi xmlns:a14="http://schemas.microsoft.com/office/drawing/2010/main" val="0"/>
+              </a:ext>
+            </a:extLst>
+          </a:blip>
+          <a:srcRect/>
+          <a:stretch>
+            <a:fillRect/>
+          </a:stretch>
+        </p:blipFill>
+        <p:spPr bwMode="auto">
+          <a:xfrm>
+            <a:off x="3619500" y="2933700"/>
+            <a:ext cx="1828800" cy="1828800"/>
+          </a:xfrm>
+          <a:prstGeom prst="rect">
+            <a:avLst/>
+          </a:prstGeom>
+          <a:noFill/>
+          <a:extLst>
+            <a:ext uri="{909E8E84-426E-40DD-AFC4-6F175D3DCCD1}">
+              <a14:hiddenFill xmlns:a14="http://schemas.microsoft.com/office/drawing/2010/main">
+                <a:solidFill>
+                  <a:srgbClr val="FFFFFF"/>
+                </a:solidFill>
+              </a14:hiddenFill>
+            </a:ext>
+          </a:extLst>
+        </p:spPr>
+      </p:pic>
+    </p:spTree>
+    <p:extLst>
+      <p:ext uri="{BB962C8B-B14F-4D97-AF65-F5344CB8AC3E}">
+        <p14:creationId xmlns:p14="http://schemas.microsoft.com/office/powerpoint/2010/main" val="1913378769"/>
       </p:ext>
     </p:extLst>
   </p:cSld>

</xml_diff>

<commit_message>
Add updated class diagram to presentation
</commit_message>
<xml_diff>
--- a/Documents/Presentation.pptx
+++ b/Documents/Presentation.pptx
@@ -5630,28 +5630,31 @@
             <p:ph type="title"/>
           </p:nvPr>
         </p:nvSpPr>
-        <p:spPr/>
-        <p:txBody>
-          <a:bodyPr/>
-          <a:lstStyle/>
-          <a:p>
-            <a:r>
-              <a:rPr lang="en-US" dirty="0" smtClean="0"/>
+        <p:spPr>
+          <a:xfrm>
+            <a:off x="457200" y="0"/>
+            <a:ext cx="8229600" cy="685800"/>
+          </a:xfrm>
+        </p:spPr>
+        <p:txBody>
+          <a:bodyPr/>
+          <a:lstStyle/>
+          <a:p>
+            <a:r>
+              <a:rPr lang="en-US" sz="4000" dirty="0" smtClean="0"/>
               <a:t>Design – Class Diagram</a:t>
             </a:r>
-            <a:endParaRPr lang="en-US" dirty="0"/>
+            <a:endParaRPr lang="en-US" sz="4000" dirty="0"/>
           </a:p>
         </p:txBody>
       </p:sp>
       <p:pic>
         <p:nvPicPr>
-          <p:cNvPr id="4" name="Content Placeholder 3" descr="Class Diagram.png"/>
+          <p:cNvPr id="1027" name="Picture 3" descr="C:\Users\bpasse.ZIROUS\Documents\GitHub\SEIS635Project\Documents\Class Diagram.png"/>
           <p:cNvPicPr>
-            <a:picLocks noGrp="1" noChangeAspect="1"/>
+            <a:picLocks noChangeAspect="1" noChangeArrowheads="1"/>
           </p:cNvPicPr>
-          <p:nvPr>
-            <p:ph idx="1"/>
-          </p:nvPr>
+          <p:nvPr/>
         </p:nvPicPr>
         <p:blipFill>
           <a:blip r:embed="rId3">
@@ -5661,12 +5664,30 @@
               </a:ext>
             </a:extLst>
           </a:blip>
-          <a:srcRect l="-10968" r="-10968"/>
+          <a:srcRect/>
           <a:stretch>
             <a:fillRect/>
           </a:stretch>
         </p:blipFill>
-        <p:spPr/>
+        <p:spPr bwMode="auto">
+          <a:xfrm>
+            <a:off x="228600" y="609600"/>
+            <a:ext cx="8610600" cy="6065006"/>
+          </a:xfrm>
+          <a:prstGeom prst="rect">
+            <a:avLst/>
+          </a:prstGeom>
+          <a:noFill/>
+          <a:extLst>
+            <a:ext uri="{909E8E84-426E-40DD-AFC4-6F175D3DCCD1}">
+              <a14:hiddenFill xmlns:a14="http://schemas.microsoft.com/office/drawing/2010/main">
+                <a:solidFill>
+                  <a:srgbClr val="FFFFFF"/>
+                </a:solidFill>
+              </a14:hiddenFill>
+            </a:ext>
+          </a:extLst>
+        </p:spPr>
       </p:pic>
     </p:spTree>
     <p:extLst>

</xml_diff>